<commit_message>
Changed powerpoint, fixed random git symbols showing up in config files
</commit_message>
<xml_diff>
--- a/Autocoders/doc/Cosmos_Presentation.pptx
+++ b/Autocoders/doc/Cosmos_Presentation.pptx
@@ -958,7 +958,7 @@
           <a:noFill/>
           <a:extLst>
             <a:ext uri="{909E8E84-426E-40dd-AFC4-6F175D3DCCD1}">
-              <a14:hiddenFill xmlns="" xmlns:a14="http://schemas.microsoft.com/office/drawing/2010/main">
+              <a14:hiddenFill xmlns:a14="http://schemas.microsoft.com/office/drawing/2010/main" xmlns="">
                 <a:solidFill>
                   <a:srgbClr val="FFFFFF"/>
                 </a:solidFill>
@@ -1018,7 +1018,7 @@
             </a:ln>
             <a:extLst>
               <a:ext uri="{91240B29-F687-4f45-9708-019B960494DF}">
-                <a14:hiddenLine xmlns="" xmlns:a14="http://schemas.microsoft.com/office/drawing/2010/main" w="9525">
+                <a14:hiddenLine xmlns:a14="http://schemas.microsoft.com/office/drawing/2010/main" xmlns="" w="9525">
                   <a:solidFill>
                     <a:srgbClr val="000000"/>
                   </a:solidFill>
@@ -1108,7 +1108,7 @@
             </a:ln>
             <a:extLst>
               <a:ext uri="{91240B29-F687-4f45-9708-019B960494DF}">
-                <a14:hiddenLine xmlns="" xmlns:a14="http://schemas.microsoft.com/office/drawing/2010/main" w="9525">
+                <a14:hiddenLine xmlns:a14="http://schemas.microsoft.com/office/drawing/2010/main" xmlns="" w="9525">
                   <a:solidFill>
                     <a:srgbClr val="000000"/>
                   </a:solidFill>
@@ -1198,7 +1198,7 @@
             </a:ln>
             <a:extLst>
               <a:ext uri="{91240B29-F687-4f45-9708-019B960494DF}">
-                <a14:hiddenLine xmlns="" xmlns:a14="http://schemas.microsoft.com/office/drawing/2010/main" w="9525">
+                <a14:hiddenLine xmlns:a14="http://schemas.microsoft.com/office/drawing/2010/main" xmlns="" w="9525">
                   <a:solidFill>
                     <a:srgbClr val="000000"/>
                   </a:solidFill>
@@ -1232,7 +1232,7 @@
             </a:ln>
             <a:extLst>
               <a:ext uri="{91240B29-F687-4f45-9708-019B960494DF}">
-                <a14:hiddenLine xmlns="" xmlns:a14="http://schemas.microsoft.com/office/drawing/2010/main" w="9525">
+                <a14:hiddenLine xmlns:a14="http://schemas.microsoft.com/office/drawing/2010/main" xmlns="" w="9525">
                   <a:solidFill>
                     <a:srgbClr val="000000"/>
                   </a:solidFill>
@@ -1322,7 +1322,7 @@
             </a:ln>
             <a:extLst>
               <a:ext uri="{91240B29-F687-4f45-9708-019B960494DF}">
-                <a14:hiddenLine xmlns="" xmlns:a14="http://schemas.microsoft.com/office/drawing/2010/main" w="9525">
+                <a14:hiddenLine xmlns:a14="http://schemas.microsoft.com/office/drawing/2010/main" xmlns="" w="9525">
                   <a:solidFill>
                     <a:srgbClr val="000000"/>
                   </a:solidFill>
@@ -1384,7 +1384,7 @@
             </a:ln>
             <a:extLst>
               <a:ext uri="{91240B29-F687-4f45-9708-019B960494DF}">
-                <a14:hiddenLine xmlns="" xmlns:a14="http://schemas.microsoft.com/office/drawing/2010/main" w="9525">
+                <a14:hiddenLine xmlns:a14="http://schemas.microsoft.com/office/drawing/2010/main" xmlns="" w="9525">
                   <a:solidFill>
                     <a:srgbClr val="000000"/>
                   </a:solidFill>
@@ -1446,7 +1446,7 @@
             </a:ln>
             <a:extLst>
               <a:ext uri="{91240B29-F687-4f45-9708-019B960494DF}">
-                <a14:hiddenLine xmlns="" xmlns:a14="http://schemas.microsoft.com/office/drawing/2010/main" w="9525">
+                <a14:hiddenLine xmlns:a14="http://schemas.microsoft.com/office/drawing/2010/main" xmlns="" w="9525">
                   <a:solidFill>
                     <a:srgbClr val="000000"/>
                   </a:solidFill>
@@ -1536,7 +1536,7 @@
             </a:ln>
             <a:extLst>
               <a:ext uri="{91240B29-F687-4f45-9708-019B960494DF}">
-                <a14:hiddenLine xmlns="" xmlns:a14="http://schemas.microsoft.com/office/drawing/2010/main" w="9525">
+                <a14:hiddenLine xmlns:a14="http://schemas.microsoft.com/office/drawing/2010/main" xmlns="" w="9525">
                   <a:solidFill>
                     <a:srgbClr val="000000"/>
                   </a:solidFill>
@@ -1598,7 +1598,7 @@
             </a:ln>
             <a:extLst>
               <a:ext uri="{91240B29-F687-4f45-9708-019B960494DF}">
-                <a14:hiddenLine xmlns="" xmlns:a14="http://schemas.microsoft.com/office/drawing/2010/main" w="9525">
+                <a14:hiddenLine xmlns:a14="http://schemas.microsoft.com/office/drawing/2010/main" xmlns="" w="9525">
                   <a:solidFill>
                     <a:srgbClr val="000000"/>
                   </a:solidFill>
@@ -1660,7 +1660,7 @@
             </a:ln>
             <a:extLst>
               <a:ext uri="{91240B29-F687-4f45-9708-019B960494DF}">
-                <a14:hiddenLine xmlns="" xmlns:a14="http://schemas.microsoft.com/office/drawing/2010/main" w="9525">
+                <a14:hiddenLine xmlns:a14="http://schemas.microsoft.com/office/drawing/2010/main" xmlns="" w="9525">
                   <a:solidFill>
                     <a:srgbClr val="000000"/>
                   </a:solidFill>
@@ -1750,7 +1750,7 @@
             </a:ln>
             <a:extLst>
               <a:ext uri="{91240B29-F687-4f45-9708-019B960494DF}">
-                <a14:hiddenLine xmlns="" xmlns:a14="http://schemas.microsoft.com/office/drawing/2010/main" w="9525">
+                <a14:hiddenLine xmlns:a14="http://schemas.microsoft.com/office/drawing/2010/main" xmlns="" w="9525">
                   <a:solidFill>
                     <a:srgbClr val="000000"/>
                   </a:solidFill>
@@ -1840,7 +1840,7 @@
             </a:ln>
             <a:extLst>
               <a:ext uri="{91240B29-F687-4f45-9708-019B960494DF}">
-                <a14:hiddenLine xmlns="" xmlns:a14="http://schemas.microsoft.com/office/drawing/2010/main" w="9525">
+                <a14:hiddenLine xmlns:a14="http://schemas.microsoft.com/office/drawing/2010/main" xmlns="" w="9525">
                   <a:solidFill>
                     <a:srgbClr val="000000"/>
                   </a:solidFill>
@@ -1902,7 +1902,7 @@
             </a:ln>
             <a:extLst>
               <a:ext uri="{91240B29-F687-4f45-9708-019B960494DF}">
-                <a14:hiddenLine xmlns="" xmlns:a14="http://schemas.microsoft.com/office/drawing/2010/main" w="9525">
+                <a14:hiddenLine xmlns:a14="http://schemas.microsoft.com/office/drawing/2010/main" xmlns="" w="9525">
                   <a:solidFill>
                     <a:srgbClr val="000000"/>
                   </a:solidFill>
@@ -2012,7 +2012,7 @@
             </a:ln>
             <a:extLst>
               <a:ext uri="{91240B29-F687-4f45-9708-019B960494DF}">
-                <a14:hiddenLine xmlns="" xmlns:a14="http://schemas.microsoft.com/office/drawing/2010/main" w="9525">
+                <a14:hiddenLine xmlns:a14="http://schemas.microsoft.com/office/drawing/2010/main" xmlns="" w="9525">
                   <a:solidFill>
                     <a:srgbClr val="000000"/>
                   </a:solidFill>
@@ -2074,7 +2074,7 @@
             </a:ln>
             <a:extLst>
               <a:ext uri="{91240B29-F687-4f45-9708-019B960494DF}">
-                <a14:hiddenLine xmlns="" xmlns:a14="http://schemas.microsoft.com/office/drawing/2010/main" w="9525">
+                <a14:hiddenLine xmlns:a14="http://schemas.microsoft.com/office/drawing/2010/main" xmlns="" w="9525">
                   <a:solidFill>
                     <a:srgbClr val="000000"/>
                   </a:solidFill>
@@ -2164,7 +2164,7 @@
             </a:ln>
             <a:extLst>
               <a:ext uri="{91240B29-F687-4f45-9708-019B960494DF}">
-                <a14:hiddenLine xmlns="" xmlns:a14="http://schemas.microsoft.com/office/drawing/2010/main" w="9525">
+                <a14:hiddenLine xmlns:a14="http://schemas.microsoft.com/office/drawing/2010/main" xmlns="" w="9525">
                   <a:solidFill>
                     <a:srgbClr val="000000"/>
                   </a:solidFill>
@@ -2254,7 +2254,7 @@
             </a:ln>
             <a:extLst>
               <a:ext uri="{91240B29-F687-4f45-9708-019B960494DF}">
-                <a14:hiddenLine xmlns="" xmlns:a14="http://schemas.microsoft.com/office/drawing/2010/main" w="9525">
+                <a14:hiddenLine xmlns:a14="http://schemas.microsoft.com/office/drawing/2010/main" xmlns="" w="9525">
                   <a:solidFill>
                     <a:srgbClr val="000000"/>
                   </a:solidFill>
@@ -2316,7 +2316,7 @@
             </a:ln>
             <a:extLst>
               <a:ext uri="{91240B29-F687-4f45-9708-019B960494DF}">
-                <a14:hiddenLine xmlns="" xmlns:a14="http://schemas.microsoft.com/office/drawing/2010/main" w="9525">
+                <a14:hiddenLine xmlns:a14="http://schemas.microsoft.com/office/drawing/2010/main" xmlns="" w="9525">
                   <a:solidFill>
                     <a:srgbClr val="000000"/>
                   </a:solidFill>
@@ -2406,7 +2406,7 @@
             </a:ln>
             <a:extLst>
               <a:ext uri="{91240B29-F687-4f45-9708-019B960494DF}">
-                <a14:hiddenLine xmlns="" xmlns:a14="http://schemas.microsoft.com/office/drawing/2010/main" w="9525">
+                <a14:hiddenLine xmlns:a14="http://schemas.microsoft.com/office/drawing/2010/main" xmlns="" w="9525">
                   <a:solidFill>
                     <a:srgbClr val="000000"/>
                   </a:solidFill>
@@ -2496,7 +2496,7 @@
             </a:ln>
             <a:extLst>
               <a:ext uri="{91240B29-F687-4f45-9708-019B960494DF}">
-                <a14:hiddenLine xmlns="" xmlns:a14="http://schemas.microsoft.com/office/drawing/2010/main" w="9525">
+                <a14:hiddenLine xmlns:a14="http://schemas.microsoft.com/office/drawing/2010/main" xmlns="" w="9525">
                   <a:solidFill>
                     <a:srgbClr val="000000"/>
                   </a:solidFill>
@@ -2552,7 +2552,7 @@
             </a:ln>
             <a:extLst>
               <a:ext uri="{91240B29-F687-4f45-9708-019B960494DF}">
-                <a14:hiddenLine xmlns="" xmlns:a14="http://schemas.microsoft.com/office/drawing/2010/main" w="9525">
+                <a14:hiddenLine xmlns:a14="http://schemas.microsoft.com/office/drawing/2010/main" xmlns="" w="9525">
                   <a:solidFill>
                     <a:srgbClr val="000000"/>
                   </a:solidFill>
@@ -2642,7 +2642,7 @@
             </a:ln>
             <a:extLst>
               <a:ext uri="{91240B29-F687-4f45-9708-019B960494DF}">
-                <a14:hiddenLine xmlns="" xmlns:a14="http://schemas.microsoft.com/office/drawing/2010/main" w="9525">
+                <a14:hiddenLine xmlns:a14="http://schemas.microsoft.com/office/drawing/2010/main" xmlns="" w="9525">
                   <a:solidFill>
                     <a:srgbClr val="000000"/>
                   </a:solidFill>
@@ -2698,7 +2698,7 @@
             </a:ln>
             <a:extLst>
               <a:ext uri="{91240B29-F687-4f45-9708-019B960494DF}">
-                <a14:hiddenLine xmlns="" xmlns:a14="http://schemas.microsoft.com/office/drawing/2010/main" w="9525">
+                <a14:hiddenLine xmlns:a14="http://schemas.microsoft.com/office/drawing/2010/main" xmlns="" w="9525">
                   <a:solidFill>
                     <a:srgbClr val="000000"/>
                   </a:solidFill>
@@ -2788,7 +2788,7 @@
             </a:ln>
             <a:extLst>
               <a:ext uri="{91240B29-F687-4f45-9708-019B960494DF}">
-                <a14:hiddenLine xmlns="" xmlns:a14="http://schemas.microsoft.com/office/drawing/2010/main" w="9525">
+                <a14:hiddenLine xmlns:a14="http://schemas.microsoft.com/office/drawing/2010/main" xmlns="" w="9525">
                   <a:solidFill>
                     <a:srgbClr val="000000"/>
                   </a:solidFill>
@@ -2856,7 +2856,7 @@
             </a:ln>
             <a:extLst>
               <a:ext uri="{91240B29-F687-4f45-9708-019B960494DF}">
-                <a14:hiddenLine xmlns="" xmlns:a14="http://schemas.microsoft.com/office/drawing/2010/main" w="9525">
+                <a14:hiddenLine xmlns:a14="http://schemas.microsoft.com/office/drawing/2010/main" xmlns="" w="9525">
                   <a:solidFill>
                     <a:srgbClr val="000000"/>
                   </a:solidFill>
@@ -2946,7 +2946,7 @@
             </a:ln>
             <a:extLst>
               <a:ext uri="{91240B29-F687-4f45-9708-019B960494DF}">
-                <a14:hiddenLine xmlns="" xmlns:a14="http://schemas.microsoft.com/office/drawing/2010/main" w="9525">
+                <a14:hiddenLine xmlns:a14="http://schemas.microsoft.com/office/drawing/2010/main" xmlns="" w="9525">
                   <a:solidFill>
                     <a:srgbClr val="000000"/>
                   </a:solidFill>
@@ -3014,7 +3014,7 @@
             </a:ln>
             <a:extLst>
               <a:ext uri="{91240B29-F687-4f45-9708-019B960494DF}">
-                <a14:hiddenLine xmlns="" xmlns:a14="http://schemas.microsoft.com/office/drawing/2010/main" w="9525">
+                <a14:hiddenLine xmlns:a14="http://schemas.microsoft.com/office/drawing/2010/main" xmlns="" w="9525">
                   <a:solidFill>
                     <a:srgbClr val="000000"/>
                   </a:solidFill>
@@ -3104,7 +3104,7 @@
             </a:ln>
             <a:extLst>
               <a:ext uri="{91240B29-F687-4f45-9708-019B960494DF}">
-                <a14:hiddenLine xmlns="" xmlns:a14="http://schemas.microsoft.com/office/drawing/2010/main" w="9525">
+                <a14:hiddenLine xmlns:a14="http://schemas.microsoft.com/office/drawing/2010/main" xmlns="" w="9525">
                   <a:solidFill>
                     <a:srgbClr val="000000"/>
                   </a:solidFill>
@@ -3138,7 +3138,7 @@
             </a:ln>
             <a:extLst>
               <a:ext uri="{91240B29-F687-4f45-9708-019B960494DF}">
-                <a14:hiddenLine xmlns="" xmlns:a14="http://schemas.microsoft.com/office/drawing/2010/main" w="9525">
+                <a14:hiddenLine xmlns:a14="http://schemas.microsoft.com/office/drawing/2010/main" xmlns="" w="9525">
                   <a:solidFill>
                     <a:srgbClr val="000000"/>
                   </a:solidFill>
@@ -3228,7 +3228,7 @@
             </a:ln>
             <a:extLst>
               <a:ext uri="{91240B29-F687-4f45-9708-019B960494DF}">
-                <a14:hiddenLine xmlns="" xmlns:a14="http://schemas.microsoft.com/office/drawing/2010/main" w="9525">
+                <a14:hiddenLine xmlns:a14="http://schemas.microsoft.com/office/drawing/2010/main" xmlns="" w="9525">
                   <a:solidFill>
                     <a:srgbClr val="000000"/>
                   </a:solidFill>
@@ -3290,7 +3290,7 @@
             </a:ln>
             <a:extLst>
               <a:ext uri="{91240B29-F687-4f45-9708-019B960494DF}">
-                <a14:hiddenLine xmlns="" xmlns:a14="http://schemas.microsoft.com/office/drawing/2010/main" w="9525">
+                <a14:hiddenLine xmlns:a14="http://schemas.microsoft.com/office/drawing/2010/main" xmlns="" w="9525">
                   <a:solidFill>
                     <a:srgbClr val="000000"/>
                   </a:solidFill>
@@ -3352,7 +3352,7 @@
             </a:ln>
             <a:extLst>
               <a:ext uri="{91240B29-F687-4f45-9708-019B960494DF}">
-                <a14:hiddenLine xmlns="" xmlns:a14="http://schemas.microsoft.com/office/drawing/2010/main" w="9525">
+                <a14:hiddenLine xmlns:a14="http://schemas.microsoft.com/office/drawing/2010/main" xmlns="" w="9525">
                   <a:solidFill>
                     <a:srgbClr val="000000"/>
                   </a:solidFill>
@@ -3442,7 +3442,7 @@
             </a:ln>
             <a:extLst>
               <a:ext uri="{91240B29-F687-4f45-9708-019B960494DF}">
-                <a14:hiddenLine xmlns="" xmlns:a14="http://schemas.microsoft.com/office/drawing/2010/main" w="9525">
+                <a14:hiddenLine xmlns:a14="http://schemas.microsoft.com/office/drawing/2010/main" xmlns="" w="9525">
                   <a:solidFill>
                     <a:srgbClr val="000000"/>
                   </a:solidFill>
@@ -3510,7 +3510,7 @@
             </a:ln>
             <a:extLst>
               <a:ext uri="{91240B29-F687-4f45-9708-019B960494DF}">
-                <a14:hiddenLine xmlns="" xmlns:a14="http://schemas.microsoft.com/office/drawing/2010/main" w="9525">
+                <a14:hiddenLine xmlns:a14="http://schemas.microsoft.com/office/drawing/2010/main" xmlns="" w="9525">
                   <a:solidFill>
                     <a:srgbClr val="000000"/>
                   </a:solidFill>
@@ -3572,7 +3572,7 @@
             </a:ln>
             <a:extLst>
               <a:ext uri="{91240B29-F687-4f45-9708-019B960494DF}">
-                <a14:hiddenLine xmlns="" xmlns:a14="http://schemas.microsoft.com/office/drawing/2010/main" w="9525">
+                <a14:hiddenLine xmlns:a14="http://schemas.microsoft.com/office/drawing/2010/main" xmlns="" w="9525">
                   <a:solidFill>
                     <a:srgbClr val="000000"/>
                   </a:solidFill>
@@ -3662,7 +3662,7 @@
             </a:ln>
             <a:extLst>
               <a:ext uri="{91240B29-F687-4f45-9708-019B960494DF}">
-                <a14:hiddenLine xmlns="" xmlns:a14="http://schemas.microsoft.com/office/drawing/2010/main" w="9525">
+                <a14:hiddenLine xmlns:a14="http://schemas.microsoft.com/office/drawing/2010/main" xmlns="" w="9525">
                   <a:solidFill>
                     <a:srgbClr val="000000"/>
                   </a:solidFill>
@@ -3724,7 +3724,7 @@
             </a:ln>
             <a:extLst>
               <a:ext uri="{91240B29-F687-4f45-9708-019B960494DF}">
-                <a14:hiddenLine xmlns="" xmlns:a14="http://schemas.microsoft.com/office/drawing/2010/main" w="9525">
+                <a14:hiddenLine xmlns:a14="http://schemas.microsoft.com/office/drawing/2010/main" xmlns="" w="9525">
                   <a:solidFill>
                     <a:srgbClr val="000000"/>
                   </a:solidFill>
@@ -3814,7 +3814,7 @@
             </a:ln>
             <a:extLst>
               <a:ext uri="{91240B29-F687-4f45-9708-019B960494DF}">
-                <a14:hiddenLine xmlns="" xmlns:a14="http://schemas.microsoft.com/office/drawing/2010/main" w="9525">
+                <a14:hiddenLine xmlns:a14="http://schemas.microsoft.com/office/drawing/2010/main" xmlns="" w="9525">
                   <a:solidFill>
                     <a:srgbClr val="000000"/>
                   </a:solidFill>
@@ -3876,7 +3876,7 @@
             </a:ln>
             <a:extLst>
               <a:ext uri="{91240B29-F687-4f45-9708-019B960494DF}">
-                <a14:hiddenLine xmlns="" xmlns:a14="http://schemas.microsoft.com/office/drawing/2010/main" w="9525">
+                <a14:hiddenLine xmlns:a14="http://schemas.microsoft.com/office/drawing/2010/main" xmlns="" w="9525">
                   <a:solidFill>
                     <a:srgbClr val="000000"/>
                   </a:solidFill>
@@ -3966,7 +3966,7 @@
             </a:ln>
             <a:extLst>
               <a:ext uri="{91240B29-F687-4f45-9708-019B960494DF}">
-                <a14:hiddenLine xmlns="" xmlns:a14="http://schemas.microsoft.com/office/drawing/2010/main" w="9525">
+                <a14:hiddenLine xmlns:a14="http://schemas.microsoft.com/office/drawing/2010/main" xmlns="" w="9525">
                   <a:solidFill>
                     <a:srgbClr val="000000"/>
                   </a:solidFill>
@@ -4000,7 +4000,7 @@
             </a:ln>
             <a:extLst>
               <a:ext uri="{91240B29-F687-4f45-9708-019B960494DF}">
-                <a14:hiddenLine xmlns="" xmlns:a14="http://schemas.microsoft.com/office/drawing/2010/main" w="9525">
+                <a14:hiddenLine xmlns:a14="http://schemas.microsoft.com/office/drawing/2010/main" xmlns="" w="9525">
                   <a:solidFill>
                     <a:srgbClr val="000000"/>
                   </a:solidFill>
@@ -4065,7 +4065,7 @@
             </a:ln>
             <a:extLst>
               <a:ext uri="{91240B29-F687-4f45-9708-019B960494DF}">
-                <a14:hiddenLine xmlns="" xmlns:a14="http://schemas.microsoft.com/office/drawing/2010/main" w="9525">
+                <a14:hiddenLine xmlns:a14="http://schemas.microsoft.com/office/drawing/2010/main" xmlns="" w="9525">
                   <a:solidFill>
                     <a:srgbClr val="000000"/>
                   </a:solidFill>
@@ -4155,7 +4155,7 @@
             </a:ln>
             <a:extLst>
               <a:ext uri="{91240B29-F687-4f45-9708-019B960494DF}">
-                <a14:hiddenLine xmlns="" xmlns:a14="http://schemas.microsoft.com/office/drawing/2010/main" w="9525">
+                <a14:hiddenLine xmlns:a14="http://schemas.microsoft.com/office/drawing/2010/main" xmlns="" w="9525">
                   <a:solidFill>
                     <a:srgbClr val="000000"/>
                   </a:solidFill>
@@ -4217,7 +4217,7 @@
             </a:ln>
             <a:extLst>
               <a:ext uri="{91240B29-F687-4f45-9708-019B960494DF}">
-                <a14:hiddenLine xmlns="" xmlns:a14="http://schemas.microsoft.com/office/drawing/2010/main" w="9525">
+                <a14:hiddenLine xmlns:a14="http://schemas.microsoft.com/office/drawing/2010/main" xmlns="" w="9525">
                   <a:solidFill>
                     <a:srgbClr val="000000"/>
                   </a:solidFill>
@@ -4307,7 +4307,7 @@
             </a:ln>
             <a:extLst>
               <a:ext uri="{91240B29-F687-4f45-9708-019B960494DF}">
-                <a14:hiddenLine xmlns="" xmlns:a14="http://schemas.microsoft.com/office/drawing/2010/main" w="9525">
+                <a14:hiddenLine xmlns:a14="http://schemas.microsoft.com/office/drawing/2010/main" xmlns="" w="9525">
                   <a:solidFill>
                     <a:srgbClr val="000000"/>
                   </a:solidFill>
@@ -4397,7 +4397,7 @@
             </a:ln>
             <a:extLst>
               <a:ext uri="{91240B29-F687-4f45-9708-019B960494DF}">
-                <a14:hiddenLine xmlns="" xmlns:a14="http://schemas.microsoft.com/office/drawing/2010/main" w="9525">
+                <a14:hiddenLine xmlns:a14="http://schemas.microsoft.com/office/drawing/2010/main" xmlns="" w="9525">
                   <a:solidFill>
                     <a:srgbClr val="000000"/>
                   </a:solidFill>
@@ -4462,7 +4462,7 @@
             </a:ln>
             <a:extLst>
               <a:ext uri="{91240B29-F687-4f45-9708-019B960494DF}">
-                <a14:hiddenLine xmlns="" xmlns:a14="http://schemas.microsoft.com/office/drawing/2010/main" w="9525">
+                <a14:hiddenLine xmlns:a14="http://schemas.microsoft.com/office/drawing/2010/main" xmlns="" w="9525">
                   <a:solidFill>
                     <a:srgbClr val="000000"/>
                   </a:solidFill>
@@ -4524,7 +4524,7 @@
             </a:ln>
             <a:extLst>
               <a:ext uri="{91240B29-F687-4f45-9708-019B960494DF}">
-                <a14:hiddenLine xmlns="" xmlns:a14="http://schemas.microsoft.com/office/drawing/2010/main" w="9525">
+                <a14:hiddenLine xmlns:a14="http://schemas.microsoft.com/office/drawing/2010/main" xmlns="" w="9525">
                   <a:solidFill>
                     <a:srgbClr val="000000"/>
                   </a:solidFill>
@@ -4614,7 +4614,7 @@
             </a:ln>
             <a:extLst>
               <a:ext uri="{91240B29-F687-4f45-9708-019B960494DF}">
-                <a14:hiddenLine xmlns="" xmlns:a14="http://schemas.microsoft.com/office/drawing/2010/main" w="9525">
+                <a14:hiddenLine xmlns:a14="http://schemas.microsoft.com/office/drawing/2010/main" xmlns="" w="9525">
                   <a:solidFill>
                     <a:srgbClr val="000000"/>
                   </a:solidFill>
@@ -4704,7 +4704,7 @@
             </a:ln>
             <a:extLst>
               <a:ext uri="{91240B29-F687-4f45-9708-019B960494DF}">
-                <a14:hiddenLine xmlns="" xmlns:a14="http://schemas.microsoft.com/office/drawing/2010/main" w="9525">
+                <a14:hiddenLine xmlns:a14="http://schemas.microsoft.com/office/drawing/2010/main" xmlns="" w="9525">
                   <a:solidFill>
                     <a:srgbClr val="000000"/>
                   </a:solidFill>
@@ -4766,7 +4766,7 @@
             </a:ln>
             <a:extLst>
               <a:ext uri="{91240B29-F687-4f45-9708-019B960494DF}">
-                <a14:hiddenLine xmlns="" xmlns:a14="http://schemas.microsoft.com/office/drawing/2010/main" w="9525">
+                <a14:hiddenLine xmlns:a14="http://schemas.microsoft.com/office/drawing/2010/main" xmlns="" w="9525">
                   <a:solidFill>
                     <a:srgbClr val="000000"/>
                   </a:solidFill>
@@ -4886,7 +4886,7 @@
             </a:ln>
             <a:extLst>
               <a:ext uri="{91240B29-F687-4f45-9708-019B960494DF}">
-                <a14:hiddenLine xmlns="" xmlns:a14="http://schemas.microsoft.com/office/drawing/2010/main" w="9525">
+                <a14:hiddenLine xmlns:a14="http://schemas.microsoft.com/office/drawing/2010/main" xmlns="" w="9525">
                   <a:solidFill>
                     <a:srgbClr val="000000"/>
                   </a:solidFill>
@@ -4954,7 +4954,7 @@
             </a:ln>
             <a:extLst>
               <a:ext uri="{91240B29-F687-4f45-9708-019B960494DF}">
-                <a14:hiddenLine xmlns="" xmlns:a14="http://schemas.microsoft.com/office/drawing/2010/main" w="9525">
+                <a14:hiddenLine xmlns:a14="http://schemas.microsoft.com/office/drawing/2010/main" xmlns="" w="9525">
                   <a:solidFill>
                     <a:srgbClr val="000000"/>
                   </a:solidFill>
@@ -5044,7 +5044,7 @@
             </a:ln>
             <a:extLst>
               <a:ext uri="{91240B29-F687-4f45-9708-019B960494DF}">
-                <a14:hiddenLine xmlns="" xmlns:a14="http://schemas.microsoft.com/office/drawing/2010/main" w="9525">
+                <a14:hiddenLine xmlns:a14="http://schemas.microsoft.com/office/drawing/2010/main" xmlns="" w="9525">
                   <a:solidFill>
                     <a:srgbClr val="000000"/>
                   </a:solidFill>
@@ -9766,7 +9766,7 @@
           <a:noFill/>
           <a:extLst>
             <a:ext uri="{909E8E84-426E-40dd-AFC4-6F175D3DCCD1}">
-              <a14:hiddenFill xmlns="" xmlns:a14="http://schemas.microsoft.com/office/drawing/2010/main">
+              <a14:hiddenFill xmlns:a14="http://schemas.microsoft.com/office/drawing/2010/main" xmlns="">
                 <a:solidFill>
                   <a:srgbClr val="FFFFFF"/>
                 </a:solidFill>
@@ -9840,7 +9840,7 @@
               </a:ln>
               <a:extLst>
                 <a:ext uri="{91240B29-F687-4f45-9708-019B960494DF}">
-                  <a14:hiddenLine xmlns="" xmlns:a14="http://schemas.microsoft.com/office/drawing/2010/main" w="9525">
+                  <a14:hiddenLine xmlns:a14="http://schemas.microsoft.com/office/drawing/2010/main" xmlns="" w="9525">
                     <a:solidFill>
                       <a:srgbClr val="000000"/>
                     </a:solidFill>
@@ -9930,7 +9930,7 @@
               </a:ln>
               <a:extLst>
                 <a:ext uri="{91240B29-F687-4f45-9708-019B960494DF}">
-                  <a14:hiddenLine xmlns="" xmlns:a14="http://schemas.microsoft.com/office/drawing/2010/main" w="9525">
+                  <a14:hiddenLine xmlns:a14="http://schemas.microsoft.com/office/drawing/2010/main" xmlns="" w="9525">
                     <a:solidFill>
                       <a:srgbClr val="000000"/>
                     </a:solidFill>
@@ -10020,7 +10020,7 @@
               </a:ln>
               <a:extLst>
                 <a:ext uri="{91240B29-F687-4f45-9708-019B960494DF}">
-                  <a14:hiddenLine xmlns="" xmlns:a14="http://schemas.microsoft.com/office/drawing/2010/main" w="9525">
+                  <a14:hiddenLine xmlns:a14="http://schemas.microsoft.com/office/drawing/2010/main" xmlns="" w="9525">
                     <a:solidFill>
                       <a:srgbClr val="000000"/>
                     </a:solidFill>
@@ -10082,7 +10082,7 @@
               </a:ln>
               <a:extLst>
                 <a:ext uri="{91240B29-F687-4f45-9708-019B960494DF}">
-                  <a14:hiddenLine xmlns="" xmlns:a14="http://schemas.microsoft.com/office/drawing/2010/main" w="9525">
+                  <a14:hiddenLine xmlns:a14="http://schemas.microsoft.com/office/drawing/2010/main" xmlns="" w="9525">
                     <a:solidFill>
                       <a:srgbClr val="000000"/>
                     </a:solidFill>
@@ -10172,7 +10172,7 @@
               </a:ln>
               <a:extLst>
                 <a:ext uri="{91240B29-F687-4f45-9708-019B960494DF}">
-                  <a14:hiddenLine xmlns="" xmlns:a14="http://schemas.microsoft.com/office/drawing/2010/main" w="9525">
+                  <a14:hiddenLine xmlns:a14="http://schemas.microsoft.com/office/drawing/2010/main" xmlns="" w="9525">
                     <a:solidFill>
                       <a:srgbClr val="000000"/>
                     </a:solidFill>
@@ -10234,7 +10234,7 @@
               </a:ln>
               <a:extLst>
                 <a:ext uri="{91240B29-F687-4f45-9708-019B960494DF}">
-                  <a14:hiddenLine xmlns="" xmlns:a14="http://schemas.microsoft.com/office/drawing/2010/main" w="9525">
+                  <a14:hiddenLine xmlns:a14="http://schemas.microsoft.com/office/drawing/2010/main" xmlns="" w="9525">
                     <a:solidFill>
                       <a:srgbClr val="000000"/>
                     </a:solidFill>
@@ -10296,7 +10296,7 @@
               </a:ln>
               <a:extLst>
                 <a:ext uri="{91240B29-F687-4f45-9708-019B960494DF}">
-                  <a14:hiddenLine xmlns="" xmlns:a14="http://schemas.microsoft.com/office/drawing/2010/main" w="9525">
+                  <a14:hiddenLine xmlns:a14="http://schemas.microsoft.com/office/drawing/2010/main" xmlns="" w="9525">
                     <a:solidFill>
                       <a:srgbClr val="000000"/>
                     </a:solidFill>
@@ -10386,7 +10386,7 @@
               </a:ln>
               <a:extLst>
                 <a:ext uri="{91240B29-F687-4f45-9708-019B960494DF}">
-                  <a14:hiddenLine xmlns="" xmlns:a14="http://schemas.microsoft.com/office/drawing/2010/main" w="9525">
+                  <a14:hiddenLine xmlns:a14="http://schemas.microsoft.com/office/drawing/2010/main" xmlns="" w="9525">
                     <a:solidFill>
                       <a:srgbClr val="000000"/>
                     </a:solidFill>
@@ -10476,7 +10476,7 @@
               </a:ln>
               <a:extLst>
                 <a:ext uri="{91240B29-F687-4f45-9708-019B960494DF}">
-                  <a14:hiddenLine xmlns="" xmlns:a14="http://schemas.microsoft.com/office/drawing/2010/main" w="9525">
+                  <a14:hiddenLine xmlns:a14="http://schemas.microsoft.com/office/drawing/2010/main" xmlns="" w="9525">
                     <a:solidFill>
                       <a:srgbClr val="000000"/>
                     </a:solidFill>
@@ -10538,7 +10538,7 @@
               </a:ln>
               <a:extLst>
                 <a:ext uri="{91240B29-F687-4f45-9708-019B960494DF}">
-                  <a14:hiddenLine xmlns="" xmlns:a14="http://schemas.microsoft.com/office/drawing/2010/main" w="9525">
+                  <a14:hiddenLine xmlns:a14="http://schemas.microsoft.com/office/drawing/2010/main" xmlns="" w="9525">
                     <a:solidFill>
                       <a:srgbClr val="000000"/>
                     </a:solidFill>
@@ -10648,7 +10648,7 @@
               </a:ln>
               <a:extLst>
                 <a:ext uri="{91240B29-F687-4f45-9708-019B960494DF}">
-                  <a14:hiddenLine xmlns="" xmlns:a14="http://schemas.microsoft.com/office/drawing/2010/main" w="9525">
+                  <a14:hiddenLine xmlns:a14="http://schemas.microsoft.com/office/drawing/2010/main" xmlns="" w="9525">
                     <a:solidFill>
                       <a:srgbClr val="000000"/>
                     </a:solidFill>
@@ -10732,7 +10732,7 @@
               </a:ln>
               <a:extLst>
                 <a:ext uri="{91240B29-F687-4f45-9708-019B960494DF}">
-                  <a14:hiddenLine xmlns="" xmlns:a14="http://schemas.microsoft.com/office/drawing/2010/main" w="9525">
+                  <a14:hiddenLine xmlns:a14="http://schemas.microsoft.com/office/drawing/2010/main" xmlns="" w="9525">
                     <a:solidFill>
                       <a:srgbClr val="000000"/>
                     </a:solidFill>
@@ -10794,7 +10794,7 @@
               </a:ln>
               <a:extLst>
                 <a:ext uri="{91240B29-F687-4f45-9708-019B960494DF}">
-                  <a14:hiddenLine xmlns="" xmlns:a14="http://schemas.microsoft.com/office/drawing/2010/main" w="9525">
+                  <a14:hiddenLine xmlns:a14="http://schemas.microsoft.com/office/drawing/2010/main" xmlns="" w="9525">
                     <a:solidFill>
                       <a:srgbClr val="000000"/>
                     </a:solidFill>
@@ -10856,7 +10856,7 @@
               </a:ln>
               <a:extLst>
                 <a:ext uri="{91240B29-F687-4f45-9708-019B960494DF}">
-                  <a14:hiddenLine xmlns="" xmlns:a14="http://schemas.microsoft.com/office/drawing/2010/main" w="9525">
+                  <a14:hiddenLine xmlns:a14="http://schemas.microsoft.com/office/drawing/2010/main" xmlns="" w="9525">
                     <a:solidFill>
                       <a:srgbClr val="000000"/>
                     </a:solidFill>
@@ -10946,7 +10946,7 @@
               </a:ln>
               <a:extLst>
                 <a:ext uri="{91240B29-F687-4f45-9708-019B960494DF}">
-                  <a14:hiddenLine xmlns="" xmlns:a14="http://schemas.microsoft.com/office/drawing/2010/main" w="9525">
+                  <a14:hiddenLine xmlns:a14="http://schemas.microsoft.com/office/drawing/2010/main" xmlns="" w="9525">
                     <a:solidFill>
                       <a:srgbClr val="000000"/>
                     </a:solidFill>
@@ -10980,7 +10980,7 @@
               </a:ln>
               <a:extLst>
                 <a:ext uri="{91240B29-F687-4f45-9708-019B960494DF}">
-                  <a14:hiddenLine xmlns="" xmlns:a14="http://schemas.microsoft.com/office/drawing/2010/main" w="9525">
+                  <a14:hiddenLine xmlns:a14="http://schemas.microsoft.com/office/drawing/2010/main" xmlns="" w="9525">
                     <a:solidFill>
                       <a:srgbClr val="000000"/>
                     </a:solidFill>
@@ -11045,7 +11045,7 @@
               </a:ln>
               <a:extLst>
                 <a:ext uri="{91240B29-F687-4f45-9708-019B960494DF}">
-                  <a14:hiddenLine xmlns="" xmlns:a14="http://schemas.microsoft.com/office/drawing/2010/main" w="9525">
+                  <a14:hiddenLine xmlns:a14="http://schemas.microsoft.com/office/drawing/2010/main" xmlns="" w="9525">
                     <a:solidFill>
                       <a:srgbClr val="000000"/>
                     </a:solidFill>
@@ -11135,7 +11135,7 @@
               </a:ln>
               <a:extLst>
                 <a:ext uri="{91240B29-F687-4f45-9708-019B960494DF}">
-                  <a14:hiddenLine xmlns="" xmlns:a14="http://schemas.microsoft.com/office/drawing/2010/main" w="9525">
+                  <a14:hiddenLine xmlns:a14="http://schemas.microsoft.com/office/drawing/2010/main" xmlns="" w="9525">
                     <a:solidFill>
                       <a:srgbClr val="000000"/>
                     </a:solidFill>
@@ -11197,7 +11197,7 @@
               </a:ln>
               <a:extLst>
                 <a:ext uri="{91240B29-F687-4f45-9708-019B960494DF}">
-                  <a14:hiddenLine xmlns="" xmlns:a14="http://schemas.microsoft.com/office/drawing/2010/main" w="9525">
+                  <a14:hiddenLine xmlns:a14="http://schemas.microsoft.com/office/drawing/2010/main" xmlns="" w="9525">
                     <a:solidFill>
                       <a:srgbClr val="000000"/>
                     </a:solidFill>
@@ -11287,7 +11287,7 @@
               </a:ln>
               <a:extLst>
                 <a:ext uri="{91240B29-F687-4f45-9708-019B960494DF}">
-                  <a14:hiddenLine xmlns="" xmlns:a14="http://schemas.microsoft.com/office/drawing/2010/main" w="9525">
+                  <a14:hiddenLine xmlns:a14="http://schemas.microsoft.com/office/drawing/2010/main" xmlns="" w="9525">
                     <a:solidFill>
                       <a:srgbClr val="000000"/>
                     </a:solidFill>
@@ -11352,7 +11352,7 @@
               </a:ln>
               <a:extLst>
                 <a:ext uri="{91240B29-F687-4f45-9708-019B960494DF}">
-                  <a14:hiddenLine xmlns="" xmlns:a14="http://schemas.microsoft.com/office/drawing/2010/main" w="9525">
+                  <a14:hiddenLine xmlns:a14="http://schemas.microsoft.com/office/drawing/2010/main" xmlns="" w="9525">
                     <a:solidFill>
                       <a:srgbClr val="000000"/>
                     </a:solidFill>
@@ -11414,7 +11414,7 @@
               </a:ln>
               <a:extLst>
                 <a:ext uri="{91240B29-F687-4f45-9708-019B960494DF}">
-                  <a14:hiddenLine xmlns="" xmlns:a14="http://schemas.microsoft.com/office/drawing/2010/main" w="9525">
+                  <a14:hiddenLine xmlns:a14="http://schemas.microsoft.com/office/drawing/2010/main" xmlns="" w="9525">
                     <a:solidFill>
                       <a:srgbClr val="000000"/>
                     </a:solidFill>
@@ -11504,7 +11504,7 @@
               </a:ln>
               <a:extLst>
                 <a:ext uri="{91240B29-F687-4f45-9708-019B960494DF}">
-                  <a14:hiddenLine xmlns="" xmlns:a14="http://schemas.microsoft.com/office/drawing/2010/main" w="9525">
+                  <a14:hiddenLine xmlns:a14="http://schemas.microsoft.com/office/drawing/2010/main" xmlns="" w="9525">
                     <a:solidFill>
                       <a:srgbClr val="000000"/>
                     </a:solidFill>
@@ -11594,7 +11594,7 @@
               </a:ln>
               <a:extLst>
                 <a:ext uri="{91240B29-F687-4f45-9708-019B960494DF}">
-                  <a14:hiddenLine xmlns="" xmlns:a14="http://schemas.microsoft.com/office/drawing/2010/main" w="9525">
+                  <a14:hiddenLine xmlns:a14="http://schemas.microsoft.com/office/drawing/2010/main" xmlns="" w="9525">
                     <a:solidFill>
                       <a:srgbClr val="000000"/>
                     </a:solidFill>
@@ -11659,7 +11659,7 @@
               </a:ln>
               <a:extLst>
                 <a:ext uri="{91240B29-F687-4f45-9708-019B960494DF}">
-                  <a14:hiddenLine xmlns="" xmlns:a14="http://schemas.microsoft.com/office/drawing/2010/main" w="9525">
+                  <a14:hiddenLine xmlns:a14="http://schemas.microsoft.com/office/drawing/2010/main" xmlns="" w="9525">
                     <a:solidFill>
                       <a:srgbClr val="000000"/>
                     </a:solidFill>
@@ -11779,7 +11779,7 @@
               </a:ln>
               <a:extLst>
                 <a:ext uri="{91240B29-F687-4f45-9708-019B960494DF}">
-                  <a14:hiddenLine xmlns="" xmlns:a14="http://schemas.microsoft.com/office/drawing/2010/main" w="9525">
+                  <a14:hiddenLine xmlns:a14="http://schemas.microsoft.com/office/drawing/2010/main" xmlns="" w="9525">
                     <a:solidFill>
                       <a:srgbClr val="000000"/>
                     </a:solidFill>
@@ -11877,7 +11877,7 @@
               </a:ln>
               <a:extLst>
                 <a:ext uri="{91240B29-F687-4f45-9708-019B960494DF}">
-                  <a14:hiddenLine xmlns="" xmlns:a14="http://schemas.microsoft.com/office/drawing/2010/main" w="9525">
+                  <a14:hiddenLine xmlns:a14="http://schemas.microsoft.com/office/drawing/2010/main" xmlns="" w="9525">
                     <a:solidFill>
                       <a:srgbClr val="000000"/>
                     </a:solidFill>
@@ -11992,7 +11992,7 @@
               </a:ln>
               <a:extLst>
                 <a:ext uri="{91240B29-F687-4f45-9708-019B960494DF}">
-                  <a14:hiddenLine xmlns="" xmlns:a14="http://schemas.microsoft.com/office/drawing/2010/main" w="9525">
+                  <a14:hiddenLine xmlns:a14="http://schemas.microsoft.com/office/drawing/2010/main" xmlns="" w="9525">
                     <a:solidFill>
                       <a:srgbClr val="000000"/>
                     </a:solidFill>
@@ -12082,7 +12082,7 @@
               </a:ln>
               <a:extLst>
                 <a:ext uri="{91240B29-F687-4f45-9708-019B960494DF}">
-                  <a14:hiddenLine xmlns="" xmlns:a14="http://schemas.microsoft.com/office/drawing/2010/main" w="9525">
+                  <a14:hiddenLine xmlns:a14="http://schemas.microsoft.com/office/drawing/2010/main" xmlns="" w="9525">
                     <a:solidFill>
                       <a:srgbClr val="000000"/>
                     </a:solidFill>
@@ -12147,7 +12147,7 @@
               </a:ln>
               <a:extLst>
                 <a:ext uri="{91240B29-F687-4f45-9708-019B960494DF}">
-                  <a14:hiddenLine xmlns="" xmlns:a14="http://schemas.microsoft.com/office/drawing/2010/main" w="9525">
+                  <a14:hiddenLine xmlns:a14="http://schemas.microsoft.com/office/drawing/2010/main" xmlns="" w="9525">
                     <a:solidFill>
                       <a:srgbClr val="000000"/>
                     </a:solidFill>
@@ -12237,7 +12237,7 @@
               </a:ln>
               <a:extLst>
                 <a:ext uri="{91240B29-F687-4f45-9708-019B960494DF}">
-                  <a14:hiddenLine xmlns="" xmlns:a14="http://schemas.microsoft.com/office/drawing/2010/main" w="9525">
+                  <a14:hiddenLine xmlns:a14="http://schemas.microsoft.com/office/drawing/2010/main" xmlns="" w="9525">
                     <a:solidFill>
                       <a:srgbClr val="000000"/>
                     </a:solidFill>
@@ -12305,7 +12305,7 @@
               </a:ln>
               <a:extLst>
                 <a:ext uri="{91240B29-F687-4f45-9708-019B960494DF}">
-                  <a14:hiddenLine xmlns="" xmlns:a14="http://schemas.microsoft.com/office/drawing/2010/main" w="9525">
+                  <a14:hiddenLine xmlns:a14="http://schemas.microsoft.com/office/drawing/2010/main" xmlns="" w="9525">
                     <a:solidFill>
                       <a:srgbClr val="000000"/>
                     </a:solidFill>
@@ -12395,7 +12395,7 @@
               </a:ln>
               <a:extLst>
                 <a:ext uri="{91240B29-F687-4f45-9708-019B960494DF}">
-                  <a14:hiddenLine xmlns="" xmlns:a14="http://schemas.microsoft.com/office/drawing/2010/main" w="9525">
+                  <a14:hiddenLine xmlns:a14="http://schemas.microsoft.com/office/drawing/2010/main" xmlns="" w="9525">
                     <a:solidFill>
                       <a:srgbClr val="000000"/>
                     </a:solidFill>
@@ -12463,7 +12463,7 @@
               </a:ln>
               <a:extLst>
                 <a:ext uri="{91240B29-F687-4f45-9708-019B960494DF}">
-                  <a14:hiddenLine xmlns="" xmlns:a14="http://schemas.microsoft.com/office/drawing/2010/main" w="9525">
+                  <a14:hiddenLine xmlns:a14="http://schemas.microsoft.com/office/drawing/2010/main" xmlns="" w="9525">
                     <a:solidFill>
                       <a:srgbClr val="000000"/>
                     </a:solidFill>
@@ -12553,7 +12553,7 @@
               </a:ln>
               <a:extLst>
                 <a:ext uri="{91240B29-F687-4f45-9708-019B960494DF}">
-                  <a14:hiddenLine xmlns="" xmlns:a14="http://schemas.microsoft.com/office/drawing/2010/main" w="9525">
+                  <a14:hiddenLine xmlns:a14="http://schemas.microsoft.com/office/drawing/2010/main" xmlns="" w="9525">
                     <a:solidFill>
                       <a:srgbClr val="000000"/>
                     </a:solidFill>
@@ -12587,7 +12587,7 @@
               </a:ln>
               <a:extLst>
                 <a:ext uri="{91240B29-F687-4f45-9708-019B960494DF}">
-                  <a14:hiddenLine xmlns="" xmlns:a14="http://schemas.microsoft.com/office/drawing/2010/main" w="9525">
+                  <a14:hiddenLine xmlns:a14="http://schemas.microsoft.com/office/drawing/2010/main" xmlns="" w="9525">
                     <a:solidFill>
                       <a:srgbClr val="000000"/>
                     </a:solidFill>
@@ -13205,6 +13205,33 @@
               <a:rPr lang="en-US" dirty="0"/>
               <a:t> deployment applications</a:t>
             </a:r>
+          </a:p>
+          <a:p>
+            <a:r>
+              <a:rPr lang="en-US" dirty="0"/>
+              <a:t>Date: 6/28/2018</a:t>
+            </a:r>
+          </a:p>
+          <a:p>
+            <a:r>
+              <a:rPr lang="en-US" dirty="0"/>
+              <a:t>Jordan </a:t>
+            </a:r>
+            <a:r>
+              <a:rPr lang="en-US" dirty="0" err="1"/>
+              <a:t>ishii</a:t>
+            </a:r>
+            <a:r>
+              <a:rPr lang="en-US"/>
+              <a:t>: jordanishii1@</a:t>
+            </a:r>
+            <a:r>
+              <a:rPr lang="en-US" dirty="0"/>
+              <a:t>gmail.com</a:t>
+            </a:r>
+          </a:p>
+          <a:p>
+            <a:endParaRPr lang="en-US" dirty="0"/>
           </a:p>
         </p:txBody>
       </p:sp>

</xml_diff>

<commit_message>
Fixed Ruby scripts in lib, modified presentation
</commit_message>
<xml_diff>
--- a/Autocoders/doc/Cosmos_Presentation.pptx
+++ b/Autocoders/doc/Cosmos_Presentation.pptx
@@ -688,7 +688,10 @@
           <a:bodyPr/>
           <a:lstStyle/>
           <a:p>
-            <a:endParaRPr lang="en-US" dirty="0"/>
+            <a:r>
+              <a:rPr lang="en-US" dirty="0"/>
+              <a:t>Say that we’ll cover the telemetry viewer and commanding apps later</a:t>
+            </a:r>
           </a:p>
         </p:txBody>
       </p:sp>
@@ -9648,13 +9651,8 @@
             </a:r>
             <a:r>
               <a:rPr lang="en-US" sz="2400" cap="none" dirty="0"/>
-              <a:t> | mid-level: generator, parser | lowest-level: models</a:t>
-            </a:r>
-            <a:r>
-              <a:rPr lang="en-US" sz="2400" cap="none"/>
-              <a:t>, writers</a:t>
-            </a:r>
-            <a:endParaRPr lang="en-US" sz="2400" cap="none" dirty="0"/>
+              <a:t> | mid-level: generator, parser | lowest-level: models, writers</a:t>
+            </a:r>
           </a:p>
         </p:txBody>
       </p:sp>
@@ -10118,7 +10116,7 @@
             </a:r>
             <a:r>
               <a:rPr lang="en-US" sz="2400" cap="none" dirty="0"/>
-              <a:t> XML</a:t>
+              <a:t> Topology XML</a:t>
             </a:r>
           </a:p>
           <a:p>
@@ -10283,12 +10281,6 @@
             <a:r>
               <a:rPr lang="en-US" sz="2000" cap="none" dirty="0"/>
               <a:t>Data viewer app for monitoring EVR’s</a:t>
-            </a:r>
-          </a:p>
-          <a:p>
-            <a:r>
-              <a:rPr lang="en-US" sz="2400" cap="none" dirty="0"/>
-              <a:t>Support for commanding</a:t>
             </a:r>
           </a:p>
         </p:txBody>
@@ -11135,13 +11127,43 @@
           <a:p>
             <a:r>
               <a:rPr lang="en-US" sz="2400" cap="none" dirty="0"/>
-              <a:t>Command and telemetry server application communicates with the other applications via JSON messaging</a:t>
-            </a:r>
-          </a:p>
-          <a:p>
-            <a:r>
-              <a:rPr lang="en-US" sz="2400" cap="none" dirty="0"/>
-              <a:t>New apps can be built using COSMOS API and JSON communication</a:t>
+              <a:t>Other utility applications:</a:t>
+            </a:r>
+          </a:p>
+          <a:p>
+            <a:pPr lvl="1"/>
+            <a:r>
+              <a:rPr lang="en-US" sz="2000" cap="none" dirty="0"/>
+              <a:t>Binary file reader (Telemetry Extractor, Table Manager)</a:t>
+            </a:r>
+          </a:p>
+          <a:p>
+            <a:pPr lvl="1"/>
+            <a:r>
+              <a:rPr lang="en-US" sz="2000" cap="none" dirty="0"/>
+              <a:t>Script runner, Test runner</a:t>
+            </a:r>
+          </a:p>
+          <a:p>
+            <a:pPr lvl="1"/>
+            <a:r>
+              <a:rPr lang="en-US" sz="2000" cap="none" dirty="0"/>
+              <a:t>Text editor for config files with documentation and syntax completion (Config Editor)</a:t>
+            </a:r>
+          </a:p>
+          <a:p>
+            <a:pPr lvl="1"/>
+            <a:r>
+              <a:rPr lang="en-US" sz="2000" cap="none" dirty="0"/>
+              <a:t>Long term trending database on top of </a:t>
+            </a:r>
+            <a:r>
+              <a:rPr lang="en-US" sz="2000" cap="none" dirty="0" err="1"/>
+              <a:t>PostgreSql</a:t>
+            </a:r>
+            <a:r>
+              <a:rPr lang="en-US" sz="2000" cap="none" dirty="0"/>
+              <a:t> database integrated within all viewer apps to simulate certain time ranges (DART)</a:t>
             </a:r>
           </a:p>
         </p:txBody>

</xml_diff>

<commit_message>
Has some minor Len changes.
</commit_message>
<xml_diff>
--- a/Autocoders/doc/Cosmos_Presentation.pptx
+++ b/Autocoders/doc/Cosmos_Presentation.pptx
@@ -9637,20 +9637,27 @@
             </a:r>
             <a:r>
               <a:rPr lang="en-US" sz="2400" cap="none" dirty="0"/>
-              <a:t> creates config files in a variable directory path, can remove targets after they are created</a:t>
-            </a:r>
-          </a:p>
-          <a:p>
-            <a:r>
-              <a:rPr lang="en-US" sz="2400" cap="none" dirty="0"/>
+              <a:t> generates config files</a:t>
+            </a:r>
+          </a:p>
+          <a:p>
+            <a:pPr lvl="1"/>
+            <a:r>
+              <a:rPr lang="en-US" sz="2200" cap="none" dirty="0"/>
+              <a:t>Certain files optionally edited </a:t>
+            </a:r>
+          </a:p>
+          <a:p>
+            <a:r>
+              <a:rPr lang="en-US" sz="2600" cap="none" dirty="0"/>
               <a:t>Structure of tool -&gt; highest-level: </a:t>
             </a:r>
             <a:r>
-              <a:rPr lang="en-US" sz="2400" cap="none" dirty="0" err="1"/>
+              <a:rPr lang="en-US" sz="2600" cap="none" dirty="0" err="1"/>
               <a:t>cosmosgen</a:t>
             </a:r>
             <a:r>
-              <a:rPr lang="en-US" sz="2400" cap="none" dirty="0"/>
+              <a:rPr lang="en-US" sz="2600" cap="none" dirty="0"/>
               <a:t> | mid-level: generator, parser | lowest-level: models, writers</a:t>
             </a:r>
           </a:p>
@@ -9918,8 +9925,8 @@
         </p:nvSpPr>
         <p:spPr>
           <a:xfrm>
-            <a:off x="994874" y="1053733"/>
-            <a:ext cx="9905999" cy="5405681"/>
+            <a:off x="571128" y="1076036"/>
+            <a:ext cx="10580092" cy="5570091"/>
           </a:xfrm>
         </p:spPr>
         <p:txBody>
@@ -9929,30 +9936,53 @@
           <a:lstStyle/>
           <a:p>
             <a:r>
-              <a:rPr lang="en-US" sz="2400" cap="none" dirty="0"/>
+              <a:rPr lang="en-US" sz="2800" cap="none" dirty="0"/>
               <a:t>COSMOS – open source system to interface embedded system commanding and telemetry-monitoring</a:t>
             </a:r>
           </a:p>
           <a:p>
             <a:r>
-              <a:rPr lang="en-US" sz="2400" cap="none" dirty="0"/>
-              <a:t>Built-in tools to send commands, receive and display EVR and channel telemetry</a:t>
-            </a:r>
-          </a:p>
-          <a:p>
-            <a:r>
-              <a:rPr lang="en-US" sz="2400" cap="none" dirty="0"/>
-              <a:t>Interface, tools configured via text files and customized with Ruby scripts, Ruby API, and JSON communication</a:t>
-            </a:r>
-          </a:p>
-          <a:p>
-            <a:r>
-              <a:rPr lang="en-US" sz="2400" cap="none" dirty="0" err="1"/>
+              <a:rPr lang="en-US" sz="2800" cap="none" dirty="0"/>
+              <a:t>Built-in tools to send commands, receive and display telemetry</a:t>
+            </a:r>
+          </a:p>
+          <a:p>
+            <a:r>
+              <a:rPr lang="en-US" sz="2800" cap="none" dirty="0"/>
+              <a:t>COSMOS configured and customized via text files</a:t>
+            </a:r>
+          </a:p>
+          <a:p>
+            <a:pPr lvl="1"/>
+            <a:r>
+              <a:rPr lang="en-US" sz="2800" cap="none" dirty="0"/>
+              <a:t>Some optional Ruby API code maybe needed</a:t>
+            </a:r>
+          </a:p>
+          <a:p>
+            <a:r>
+              <a:rPr lang="en-US" sz="2800" cap="none" dirty="0" err="1"/>
               <a:t>cosmosgen.py</a:t>
             </a:r>
             <a:r>
-              <a:rPr lang="en-US" sz="2400" cap="none" dirty="0"/>
-              <a:t> generator tool uses Topology XML files to create the necessary config files to add a deployment’s command and telemetry data to COSMOS</a:t>
+              <a:rPr lang="en-US" sz="2800" cap="none" dirty="0"/>
+              <a:t> generator tool uses </a:t>
+            </a:r>
+            <a:r>
+              <a:rPr lang="en-US" sz="2800" cap="none" dirty="0" err="1"/>
+              <a:t>Fprime</a:t>
+            </a:r>
+            <a:r>
+              <a:rPr lang="en-US" sz="2800" cap="none" dirty="0"/>
+              <a:t> topology XML to create the necessary configuration files for COSMOS to handle </a:t>
+            </a:r>
+            <a:r>
+              <a:rPr lang="en-US" sz="2800" cap="none" dirty="0" err="1"/>
+              <a:t>Fprime</a:t>
+            </a:r>
+            <a:r>
+              <a:rPr lang="en-US" sz="2800" cap="none" dirty="0"/>
+              <a:t> command and telemetry data</a:t>
             </a:r>
           </a:p>
         </p:txBody>
@@ -10090,15 +10120,7 @@
             </a:r>
             <a:r>
               <a:rPr lang="en-US" sz="2400" cap="none" dirty="0"/>
-              <a:t> GSE (</a:t>
-            </a:r>
-            <a:r>
-              <a:rPr lang="en-US" sz="2400" cap="none" dirty="0" err="1"/>
-              <a:t>a.ka</a:t>
-            </a:r>
-            <a:r>
-              <a:rPr lang="en-US" sz="2400" cap="none" dirty="0"/>
-              <a:t>. GDS)</a:t>
+              <a:t> GSE (a.k.a. GDS)</a:t>
             </a:r>
           </a:p>
           <a:p>
@@ -10130,7 +10152,21 @@
             <a:pPr lvl="1"/>
             <a:r>
               <a:rPr lang="en-US" sz="2000" cap="none" dirty="0"/>
-              <a:t>Variable length command arguments not supported (i.e. strings, etc.) – A COSMOS issue </a:t>
+              <a:t>Variable length command arguments not supported (i.e. strings, etc.) – A COSMOS issue</a:t>
+            </a:r>
+          </a:p>
+          <a:p>
+            <a:pPr lvl="1"/>
+            <a:r>
+              <a:rPr lang="en-US" sz="2000" cap="none" dirty="0"/>
+              <a:t>Not yet supporting complex serializable telemetry channels (this is coming)</a:t>
+            </a:r>
+          </a:p>
+          <a:p>
+            <a:pPr lvl="1"/>
+            <a:r>
+              <a:rPr lang="en-US" sz="2000" cap="none" dirty="0"/>
+              <a:t>Not yet tested on a Linux platform but should work </a:t>
             </a:r>
           </a:p>
           <a:p>
@@ -10264,9 +10300,31 @@
             </a:r>
           </a:p>
           <a:p>
+            <a:pPr lvl="1"/>
+            <a:r>
+              <a:rPr lang="en-US" sz="2200" cap="none" dirty="0"/>
+              <a:t>REF_INT shown is the </a:t>
+            </a:r>
+            <a:r>
+              <a:rPr lang="en-US" sz="2200" cap="none" dirty="0" err="1"/>
+              <a:t>Fprime</a:t>
+            </a:r>
+            <a:r>
+              <a:rPr lang="en-US" sz="2200" cap="none" dirty="0"/>
+              <a:t> Ref app</a:t>
+            </a:r>
+          </a:p>
+          <a:p>
             <a:r>
               <a:rPr lang="en-US" sz="2400" cap="none" dirty="0"/>
-              <a:t>Support EVR’s and channels, but no difference inside of COSMOS – both generalized as telemetry</a:t>
+              <a:t>Support EVR’s and channels</a:t>
+            </a:r>
+          </a:p>
+          <a:p>
+            <a:pPr lvl="1"/>
+            <a:r>
+              <a:rPr lang="en-US" sz="2200" cap="none" dirty="0"/>
+              <a:t>Both generalized telemetry within COSMOS</a:t>
             </a:r>
           </a:p>
           <a:p>
@@ -12686,8 +12744,8 @@
         </p:nvSpPr>
         <p:spPr>
           <a:xfrm>
-            <a:off x="622797" y="1423798"/>
-            <a:ext cx="10738964" cy="3728232"/>
+            <a:off x="459246" y="1334588"/>
+            <a:ext cx="10738964" cy="5266934"/>
           </a:xfrm>
         </p:spPr>
         <p:txBody>
@@ -12698,35 +12756,47 @@
           <a:p>
             <a:r>
               <a:rPr lang="en-US" sz="2400" cap="none" dirty="0"/>
-              <a:t>COSMOS targets, interfaces, and tools all configured in text files using COSMOS API</a:t>
+              <a:t>COSMOS installed via Ruby’s “gem install” command</a:t>
             </a:r>
           </a:p>
           <a:p>
             <a:r>
               <a:rPr lang="en-US" sz="2400" cap="none" dirty="0"/>
-              <a:t>COSMOS installed via gem install, demo built by command “cosmos demo DIR_NAME”</a:t>
+              <a:t>The default configuration generated by the command “cosmos demo DIR_NAME”</a:t>
             </a:r>
           </a:p>
           <a:p>
             <a:r>
               <a:rPr lang="en-US" sz="2400" cap="none" dirty="0"/>
-              <a:t>Main uses: specifying contents of </a:t>
-            </a:r>
-            <a:r>
-              <a:rPr lang="en-US" sz="2400" cap="none" dirty="0" err="1"/>
-              <a:t>cmd</a:t>
-            </a:r>
-            <a:r>
-              <a:rPr lang="en-US" sz="2400" cap="none" dirty="0"/>
-              <a:t>, </a:t>
-            </a:r>
-            <a:r>
-              <a:rPr lang="en-US" sz="2400" cap="none" dirty="0" err="1"/>
-              <a:t>tlm</a:t>
-            </a:r>
-            <a:r>
-              <a:rPr lang="en-US" sz="2400" cap="none" dirty="0"/>
-              <a:t> packets, creating interface, setting paths for tools to find target configurations</a:t>
+              <a:t>COSMOS has specific configuration text files to adapt it to any embedded target:</a:t>
+            </a:r>
+          </a:p>
+          <a:p>
+            <a:pPr lvl="1"/>
+            <a:r>
+              <a:rPr lang="en-US" sz="2200" cap="none" dirty="0"/>
+              <a:t>Interface/Protocol files</a:t>
+            </a:r>
+          </a:p>
+          <a:p>
+            <a:pPr lvl="1"/>
+            <a:r>
+              <a:rPr lang="en-US" sz="2200" cap="none" dirty="0"/>
+              <a:t>Command packet files</a:t>
+            </a:r>
+          </a:p>
+          <a:p>
+            <a:pPr lvl="1"/>
+            <a:r>
+              <a:rPr lang="en-US" sz="2200" cap="none" dirty="0"/>
+              <a:t>Telemetry (channel, EVR) packet files</a:t>
+            </a:r>
+          </a:p>
+          <a:p>
+            <a:pPr lvl="1"/>
+            <a:r>
+              <a:rPr lang="en-US" sz="2200" cap="none" dirty="0"/>
+              <a:t>Tools configuration files</a:t>
             </a:r>
           </a:p>
         </p:txBody>

</xml_diff>

<commit_message>
Changed behavior of file delete / append
</commit_message>
<xml_diff>
--- a/Autocoders/doc/Cosmos_Presentation.pptx
+++ b/Autocoders/doc/Cosmos_Presentation.pptx
@@ -211,7 +211,7 @@
           <a:p>
             <a:fld id="{14866109-A37E-284B-821D-A8B471871841}" type="datetimeFigureOut">
               <a:rPr lang="en-US" smtClean="0"/>
-              <a:t>6/26/18</a:t>
+              <a:t>6/28/18</a:t>
             </a:fld>
             <a:endParaRPr lang="en-US"/>
           </a:p>
@@ -1576,7 +1576,7 @@
           <a:p>
             <a:fld id="{48A87A34-81AB-432B-8DAE-1953F412C126}" type="datetimeFigureOut">
               <a:rPr lang="en-US" smtClean="0"/>
-              <a:t>6/26/18</a:t>
+              <a:t>6/28/18</a:t>
             </a:fld>
             <a:endParaRPr lang="en-US" dirty="0"/>
           </a:p>
@@ -1901,7 +1901,7 @@
             <a:fld id="{48A87A34-81AB-432B-8DAE-1953F412C126}" type="datetimeFigureOut">
               <a:rPr lang="en-US" smtClean="0"/>
               <a:pPr/>
-              <a:t>6/26/18</a:t>
+              <a:t>6/28/18</a:t>
             </a:fld>
             <a:endParaRPr lang="en-US" dirty="0"/>
           </a:p>
@@ -2137,7 +2137,7 @@
             <a:fld id="{48A87A34-81AB-432B-8DAE-1953F412C126}" type="datetimeFigureOut">
               <a:rPr lang="en-US" smtClean="0"/>
               <a:pPr/>
-              <a:t>6/26/18</a:t>
+              <a:t>6/28/18</a:t>
             </a:fld>
             <a:endParaRPr lang="en-US" dirty="0"/>
           </a:p>
@@ -2442,7 +2442,7 @@
             <a:fld id="{48A87A34-81AB-432B-8DAE-1953F412C126}" type="datetimeFigureOut">
               <a:rPr lang="en-US" smtClean="0"/>
               <a:pPr/>
-              <a:t>6/26/18</a:t>
+              <a:t>6/28/18</a:t>
             </a:fld>
             <a:endParaRPr lang="en-US" dirty="0"/>
           </a:p>
@@ -2910,7 +2910,7 @@
             <a:fld id="{48A87A34-81AB-432B-8DAE-1953F412C126}" type="datetimeFigureOut">
               <a:rPr lang="en-US" smtClean="0"/>
               <a:pPr/>
-              <a:t>6/26/18</a:t>
+              <a:t>6/28/18</a:t>
             </a:fld>
             <a:endParaRPr lang="en-US" dirty="0"/>
           </a:p>
@@ -3500,7 +3500,7 @@
             <a:fld id="{48A87A34-81AB-432B-8DAE-1953F412C126}" type="datetimeFigureOut">
               <a:rPr lang="en-US" smtClean="0"/>
               <a:pPr/>
-              <a:t>6/26/18</a:t>
+              <a:t>6/28/18</a:t>
             </a:fld>
             <a:endParaRPr lang="en-US" dirty="0"/>
           </a:p>
@@ -4366,7 +4366,7 @@
             <a:fld id="{48A87A34-81AB-432B-8DAE-1953F412C126}" type="datetimeFigureOut">
               <a:rPr lang="en-US" smtClean="0"/>
               <a:pPr/>
-              <a:t>6/26/18</a:t>
+              <a:t>6/28/18</a:t>
             </a:fld>
             <a:endParaRPr lang="en-US" dirty="0"/>
           </a:p>
@@ -4585,7 +4585,7 @@
             <a:fld id="{48A87A34-81AB-432B-8DAE-1953F412C126}" type="datetimeFigureOut">
               <a:rPr lang="en-US" smtClean="0"/>
               <a:pPr/>
-              <a:t>6/26/18</a:t>
+              <a:t>6/28/18</a:t>
             </a:fld>
             <a:endParaRPr lang="en-US" dirty="0"/>
           </a:p>
@@ -4813,7 +4813,7 @@
             <a:fld id="{48A87A34-81AB-432B-8DAE-1953F412C126}" type="datetimeFigureOut">
               <a:rPr lang="en-US" smtClean="0"/>
               <a:pPr/>
-              <a:t>6/26/18</a:t>
+              <a:t>6/28/18</a:t>
             </a:fld>
             <a:endParaRPr lang="en-US" dirty="0"/>
           </a:p>
@@ -4996,7 +4996,7 @@
           <a:p>
             <a:fld id="{48A87A34-81AB-432B-8DAE-1953F412C126}" type="datetimeFigureOut">
               <a:rPr lang="en-US" smtClean="0"/>
-              <a:t>6/26/18</a:t>
+              <a:t>6/28/18</a:t>
             </a:fld>
             <a:endParaRPr lang="en-US" dirty="0"/>
           </a:p>
@@ -5214,7 +5214,7 @@
             <a:fld id="{48A87A34-81AB-432B-8DAE-1953F412C126}" type="datetimeFigureOut">
               <a:rPr lang="en-US" smtClean="0"/>
               <a:pPr/>
-              <a:t>6/26/18</a:t>
+              <a:t>6/28/18</a:t>
             </a:fld>
             <a:endParaRPr lang="en-US" dirty="0"/>
           </a:p>
@@ -5507,7 +5507,7 @@
           <a:p>
             <a:fld id="{48A87A34-81AB-432B-8DAE-1953F412C126}" type="datetimeFigureOut">
               <a:rPr lang="en-US" smtClean="0"/>
-              <a:t>6/26/18</a:t>
+              <a:t>6/28/18</a:t>
             </a:fld>
             <a:endParaRPr lang="en-US" dirty="0"/>
           </a:p>
@@ -5787,7 +5787,7 @@
             <a:fld id="{48A87A34-81AB-432B-8DAE-1953F412C126}" type="datetimeFigureOut">
               <a:rPr lang="en-US" smtClean="0"/>
               <a:pPr/>
-              <a:t>6/26/18</a:t>
+              <a:t>6/28/18</a:t>
             </a:fld>
             <a:endParaRPr lang="en-US" dirty="0"/>
           </a:p>
@@ -6216,7 +6216,7 @@
             <a:fld id="{48A87A34-81AB-432B-8DAE-1953F412C126}" type="datetimeFigureOut">
               <a:rPr lang="en-US" smtClean="0"/>
               <a:pPr/>
-              <a:t>6/26/18</a:t>
+              <a:t>6/28/18</a:t>
             </a:fld>
             <a:endParaRPr lang="en-US" dirty="0"/>
           </a:p>
@@ -6377,7 +6377,7 @@
           <a:p>
             <a:fld id="{48A87A34-81AB-432B-8DAE-1953F412C126}" type="datetimeFigureOut">
               <a:rPr lang="en-US" smtClean="0"/>
-              <a:t>6/26/18</a:t>
+              <a:t>6/28/18</a:t>
             </a:fld>
             <a:endParaRPr lang="en-US" dirty="0"/>
           </a:p>
@@ -6514,7 +6514,7 @@
           <a:p>
             <a:fld id="{48A87A34-81AB-432B-8DAE-1953F412C126}" type="datetimeFigureOut">
               <a:rPr lang="en-US" smtClean="0"/>
-              <a:t>6/26/18</a:t>
+              <a:t>6/28/18</a:t>
             </a:fld>
             <a:endParaRPr lang="en-US" dirty="0"/>
           </a:p>
@@ -6806,7 +6806,7 @@
             <a:fld id="{48A87A34-81AB-432B-8DAE-1953F412C126}" type="datetimeFigureOut">
               <a:rPr lang="en-US" smtClean="0"/>
               <a:pPr/>
-              <a:t>6/26/18</a:t>
+              <a:t>6/28/18</a:t>
             </a:fld>
             <a:endParaRPr lang="en-US" dirty="0"/>
           </a:p>
@@ -7131,7 +7131,7 @@
           <a:p>
             <a:fld id="{48A87A34-81AB-432B-8DAE-1953F412C126}" type="datetimeFigureOut">
               <a:rPr lang="en-US" smtClean="0"/>
-              <a:t>6/26/18</a:t>
+              <a:t>6/28/18</a:t>
             </a:fld>
             <a:endParaRPr lang="en-US" dirty="0"/>
           </a:p>
@@ -7397,7 +7397,7 @@
             <a:fld id="{48A87A34-81AB-432B-8DAE-1953F412C126}" type="datetimeFigureOut">
               <a:rPr lang="en-US" smtClean="0"/>
               <a:pPr/>
-              <a:t>6/26/18</a:t>
+              <a:t>6/28/18</a:t>
             </a:fld>
             <a:endParaRPr lang="en-US" dirty="0"/>
           </a:p>
@@ -7919,7 +7919,7 @@
           <a:p>
             <a:r>
               <a:rPr lang="en-US" sz="2400" cap="none" dirty="0"/>
-              <a:t>Tailoring cosmos for use with </a:t>
+              <a:t>Tailoring COSMOS for use with </a:t>
             </a:r>
             <a:r>
               <a:rPr lang="en-US" sz="2400" cap="none" dirty="0" err="1"/>
@@ -8645,7 +8645,7 @@
                             </p:stCondLst>
                             <p:childTnLst>
                               <p:par>
-                                <p:cTn id="5" presetID="1" presetClass="exit" presetSubtype="0" fill="hold" grpId="0" nodeType="clickEffect">
+                                <p:cTn id="5" presetID="10" presetClass="entr" presetSubtype="0" fill="hold" grpId="1" nodeType="clickEffect">
                                   <p:stCondLst>
                                     <p:cond delay="0"/>
                                   </p:stCondLst>
@@ -8653,60 +8653,6 @@
                                     <p:set>
                                       <p:cBhvr>
                                         <p:cTn id="6" dur="1" fill="hold">
-                                          <p:stCondLst>
-                                            <p:cond delay="0"/>
-                                          </p:stCondLst>
-                                        </p:cTn>
-                                        <p:tgtEl>
-                                          <p:spTgt spid="13"/>
-                                        </p:tgtEl>
-                                        <p:attrNameLst>
-                                          <p:attrName>style.visibility</p:attrName>
-                                        </p:attrNameLst>
-                                      </p:cBhvr>
-                                      <p:to>
-                                        <p:strVal val="hidden"/>
-                                      </p:to>
-                                    </p:set>
-                                  </p:childTnLst>
-                                </p:cTn>
-                              </p:par>
-                              <p:par>
-                                <p:cTn id="7" presetID="1" presetClass="exit" presetSubtype="0" fill="hold" nodeType="withEffect">
-                                  <p:stCondLst>
-                                    <p:cond delay="0"/>
-                                  </p:stCondLst>
-                                  <p:childTnLst>
-                                    <p:set>
-                                      <p:cBhvr>
-                                        <p:cTn id="8" dur="1" fill="hold">
-                                          <p:stCondLst>
-                                            <p:cond delay="0"/>
-                                          </p:stCondLst>
-                                        </p:cTn>
-                                        <p:tgtEl>
-                                          <p:spTgt spid="11"/>
-                                        </p:tgtEl>
-                                        <p:attrNameLst>
-                                          <p:attrName>style.visibility</p:attrName>
-                                        </p:attrNameLst>
-                                      </p:cBhvr>
-                                      <p:to>
-                                        <p:strVal val="hidden"/>
-                                      </p:to>
-                                    </p:set>
-                                  </p:childTnLst>
-                                </p:cTn>
-                              </p:par>
-                              <p:par>
-                                <p:cTn id="9" presetID="10" presetClass="entr" presetSubtype="0" fill="hold" grpId="1" nodeType="withEffect">
-                                  <p:stCondLst>
-                                    <p:cond delay="0"/>
-                                  </p:stCondLst>
-                                  <p:childTnLst>
-                                    <p:set>
-                                      <p:cBhvr>
-                                        <p:cTn id="10" dur="1" fill="hold">
                                           <p:stCondLst>
                                             <p:cond delay="0"/>
                                           </p:stCondLst>
@@ -8724,7 +8670,7 @@
                                     </p:set>
                                     <p:animEffect transition="in" filter="fade">
                                       <p:cBhvr>
-                                        <p:cTn id="11" dur="500"/>
+                                        <p:cTn id="7" dur="500"/>
                                         <p:tgtEl>
                                           <p:spTgt spid="15"/>
                                         </p:tgtEl>
@@ -8734,14 +8680,14 @@
                                 </p:cTn>
                               </p:par>
                               <p:par>
-                                <p:cTn id="12" presetID="10" presetClass="entr" presetSubtype="0" fill="hold" nodeType="withEffect">
+                                <p:cTn id="8" presetID="10" presetClass="entr" presetSubtype="0" fill="hold" nodeType="withEffect">
                                   <p:stCondLst>
                                     <p:cond delay="0"/>
                                   </p:stCondLst>
                                   <p:childTnLst>
                                     <p:set>
                                       <p:cBhvr>
-                                        <p:cTn id="13" dur="1" fill="hold">
+                                        <p:cTn id="9" dur="1" fill="hold">
                                           <p:stCondLst>
                                             <p:cond delay="0"/>
                                           </p:stCondLst>
@@ -8759,7 +8705,7 @@
                                     </p:set>
                                     <p:animEffect transition="in" filter="fade">
                                       <p:cBhvr>
-                                        <p:cTn id="14" dur="500"/>
+                                        <p:cTn id="10" dur="500"/>
                                         <p:tgtEl>
                                           <p:spTgt spid="14"/>
                                         </p:tgtEl>
@@ -8775,80 +8721,26 @@
                     </p:cTn>
                   </p:par>
                   <p:par>
-                    <p:cTn id="15" fill="hold">
+                    <p:cTn id="11" fill="hold">
                       <p:stCondLst>
                         <p:cond delay="indefinite"/>
                       </p:stCondLst>
                       <p:childTnLst>
                         <p:par>
-                          <p:cTn id="16" fill="hold">
+                          <p:cTn id="12" fill="hold">
                             <p:stCondLst>
                               <p:cond delay="0"/>
                             </p:stCondLst>
                             <p:childTnLst>
                               <p:par>
-                                <p:cTn id="17" presetID="1" presetClass="exit" presetSubtype="0" fill="hold" grpId="0" nodeType="clickEffect">
+                                <p:cTn id="13" presetID="10" presetClass="entr" presetSubtype="0" fill="hold" grpId="1" nodeType="clickEffect">
                                   <p:stCondLst>
                                     <p:cond delay="0"/>
                                   </p:stCondLst>
                                   <p:childTnLst>
                                     <p:set>
                                       <p:cBhvr>
-                                        <p:cTn id="18" dur="1" fill="hold">
-                                          <p:stCondLst>
-                                            <p:cond delay="0"/>
-                                          </p:stCondLst>
-                                        </p:cTn>
-                                        <p:tgtEl>
-                                          <p:spTgt spid="15"/>
-                                        </p:tgtEl>
-                                        <p:attrNameLst>
-                                          <p:attrName>style.visibility</p:attrName>
-                                        </p:attrNameLst>
-                                      </p:cBhvr>
-                                      <p:to>
-                                        <p:strVal val="hidden"/>
-                                      </p:to>
-                                    </p:set>
-                                  </p:childTnLst>
-                                </p:cTn>
-                              </p:par>
-                              <p:par>
-                                <p:cTn id="19" presetID="1" presetClass="exit" presetSubtype="0" fill="hold" nodeType="withEffect">
-                                  <p:stCondLst>
-                                    <p:cond delay="0"/>
-                                  </p:stCondLst>
-                                  <p:childTnLst>
-                                    <p:set>
-                                      <p:cBhvr>
-                                        <p:cTn id="20" dur="1" fill="hold">
-                                          <p:stCondLst>
-                                            <p:cond delay="0"/>
-                                          </p:stCondLst>
-                                        </p:cTn>
-                                        <p:tgtEl>
-                                          <p:spTgt spid="14"/>
-                                        </p:tgtEl>
-                                        <p:attrNameLst>
-                                          <p:attrName>style.visibility</p:attrName>
-                                        </p:attrNameLst>
-                                      </p:cBhvr>
-                                      <p:to>
-                                        <p:strVal val="hidden"/>
-                                      </p:to>
-                                    </p:set>
-                                  </p:childTnLst>
-                                </p:cTn>
-                              </p:par>
-                              <p:par>
-                                <p:cTn id="21" presetID="10" presetClass="entr" presetSubtype="0" fill="hold" grpId="1" nodeType="withEffect">
-                                  <p:stCondLst>
-                                    <p:cond delay="0"/>
-                                  </p:stCondLst>
-                                  <p:childTnLst>
-                                    <p:set>
-                                      <p:cBhvr>
-                                        <p:cTn id="22" dur="1" fill="hold">
+                                        <p:cTn id="14" dur="1" fill="hold">
                                           <p:stCondLst>
                                             <p:cond delay="0"/>
                                           </p:stCondLst>
@@ -8866,7 +8758,7 @@
                                     </p:set>
                                     <p:animEffect transition="in" filter="fade">
                                       <p:cBhvr>
-                                        <p:cTn id="23" dur="500"/>
+                                        <p:cTn id="15" dur="500"/>
                                         <p:tgtEl>
                                           <p:spTgt spid="17"/>
                                         </p:tgtEl>
@@ -8876,14 +8768,14 @@
                                 </p:cTn>
                               </p:par>
                               <p:par>
-                                <p:cTn id="24" presetID="10" presetClass="entr" presetSubtype="0" fill="hold" nodeType="withEffect">
+                                <p:cTn id="16" presetID="10" presetClass="entr" presetSubtype="0" fill="hold" nodeType="withEffect">
                                   <p:stCondLst>
                                     <p:cond delay="0"/>
                                   </p:stCondLst>
                                   <p:childTnLst>
                                     <p:set>
                                       <p:cBhvr>
-                                        <p:cTn id="25" dur="1" fill="hold">
+                                        <p:cTn id="17" dur="1" fill="hold">
                                           <p:stCondLst>
                                             <p:cond delay="0"/>
                                           </p:stCondLst>
@@ -8901,7 +8793,7 @@
                                     </p:set>
                                     <p:animEffect transition="in" filter="fade">
                                       <p:cBhvr>
-                                        <p:cTn id="26" dur="500"/>
+                                        <p:cTn id="18" dur="500"/>
                                         <p:tgtEl>
                                           <p:spTgt spid="16"/>
                                         </p:tgtEl>
@@ -8938,8 +8830,6 @@
       </p:par>
     </p:tnLst>
     <p:bldLst>
-      <p:bldP spid="13" grpId="0" animBg="1"/>
-      <p:bldP spid="15" grpId="0" animBg="1"/>
       <p:bldP spid="15" grpId="1" animBg="1"/>
       <p:bldP spid="17" grpId="1" animBg="1"/>
     </p:bldLst>
@@ -13585,7 +13475,7 @@
                             </p:stCondLst>
                             <p:childTnLst>
                               <p:par>
-                                <p:cTn id="5" presetID="1" presetClass="exit" presetSubtype="0" fill="hold" grpId="0" nodeType="clickEffect">
+                                <p:cTn id="5" presetID="10" presetClass="entr" presetSubtype="0" fill="hold" grpId="0" nodeType="clickEffect">
                                   <p:stCondLst>
                                     <p:cond delay="0"/>
                                   </p:stCondLst>
@@ -13593,33 +13483,6 @@
                                     <p:set>
                                       <p:cBhvr>
                                         <p:cTn id="6" dur="1" fill="hold">
-                                          <p:stCondLst>
-                                            <p:cond delay="0"/>
-                                          </p:stCondLst>
-                                        </p:cTn>
-                                        <p:tgtEl>
-                                          <p:spTgt spid="49"/>
-                                        </p:tgtEl>
-                                        <p:attrNameLst>
-                                          <p:attrName>style.visibility</p:attrName>
-                                        </p:attrNameLst>
-                                      </p:cBhvr>
-                                      <p:to>
-                                        <p:strVal val="hidden"/>
-                                      </p:to>
-                                    </p:set>
-                                  </p:childTnLst>
-                                </p:cTn>
-                              </p:par>
-                              <p:par>
-                                <p:cTn id="7" presetID="10" presetClass="entr" presetSubtype="0" fill="hold" grpId="0" nodeType="withEffect">
-                                  <p:stCondLst>
-                                    <p:cond delay="0"/>
-                                  </p:stCondLst>
-                                  <p:childTnLst>
-                                    <p:set>
-                                      <p:cBhvr>
-                                        <p:cTn id="8" dur="1" fill="hold">
                                           <p:stCondLst>
                                             <p:cond delay="0"/>
                                           </p:stCondLst>
@@ -13637,7 +13500,7 @@
                                     </p:set>
                                     <p:animEffect transition="in" filter="fade">
                                       <p:cBhvr>
-                                        <p:cTn id="9" dur="500"/>
+                                        <p:cTn id="7" dur="500"/>
                                         <p:tgtEl>
                                           <p:spTgt spid="20"/>
                                         </p:tgtEl>
@@ -13653,53 +13516,26 @@
                     </p:cTn>
                   </p:par>
                   <p:par>
-                    <p:cTn id="10" fill="hold">
+                    <p:cTn id="8" fill="hold">
                       <p:stCondLst>
                         <p:cond delay="indefinite"/>
                       </p:stCondLst>
                       <p:childTnLst>
                         <p:par>
-                          <p:cTn id="11" fill="hold">
+                          <p:cTn id="9" fill="hold">
                             <p:stCondLst>
                               <p:cond delay="0"/>
                             </p:stCondLst>
                             <p:childTnLst>
                               <p:par>
-                                <p:cTn id="12" presetID="1" presetClass="exit" presetSubtype="0" fill="hold" grpId="1" nodeType="clickEffect">
+                                <p:cTn id="10" presetID="10" presetClass="entr" presetSubtype="0" fill="hold" grpId="0" nodeType="clickEffect">
                                   <p:stCondLst>
                                     <p:cond delay="0"/>
                                   </p:stCondLst>
                                   <p:childTnLst>
                                     <p:set>
                                       <p:cBhvr>
-                                        <p:cTn id="13" dur="1" fill="hold">
-                                          <p:stCondLst>
-                                            <p:cond delay="0"/>
-                                          </p:stCondLst>
-                                        </p:cTn>
-                                        <p:tgtEl>
-                                          <p:spTgt spid="20"/>
-                                        </p:tgtEl>
-                                        <p:attrNameLst>
-                                          <p:attrName>style.visibility</p:attrName>
-                                        </p:attrNameLst>
-                                      </p:cBhvr>
-                                      <p:to>
-                                        <p:strVal val="hidden"/>
-                                      </p:to>
-                                    </p:set>
-                                  </p:childTnLst>
-                                </p:cTn>
-                              </p:par>
-                              <p:par>
-                                <p:cTn id="14" presetID="10" presetClass="entr" presetSubtype="0" fill="hold" grpId="0" nodeType="withEffect">
-                                  <p:stCondLst>
-                                    <p:cond delay="0"/>
-                                  </p:stCondLst>
-                                  <p:childTnLst>
-                                    <p:set>
-                                      <p:cBhvr>
-                                        <p:cTn id="15" dur="1" fill="hold">
+                                        <p:cTn id="11" dur="1" fill="hold">
                                           <p:stCondLst>
                                             <p:cond delay="0"/>
                                           </p:stCondLst>
@@ -13717,7 +13553,7 @@
                                     </p:set>
                                     <p:animEffect transition="in" filter="fade">
                                       <p:cBhvr>
-                                        <p:cTn id="16" dur="500"/>
+                                        <p:cTn id="12" dur="500"/>
                                         <p:tgtEl>
                                           <p:spTgt spid="10"/>
                                         </p:tgtEl>
@@ -13733,53 +13569,26 @@
                     </p:cTn>
                   </p:par>
                   <p:par>
-                    <p:cTn id="17" fill="hold">
+                    <p:cTn id="13" fill="hold">
                       <p:stCondLst>
                         <p:cond delay="indefinite"/>
                       </p:stCondLst>
                       <p:childTnLst>
                         <p:par>
-                          <p:cTn id="18" fill="hold">
+                          <p:cTn id="14" fill="hold">
                             <p:stCondLst>
                               <p:cond delay="0"/>
                             </p:stCondLst>
                             <p:childTnLst>
                               <p:par>
-                                <p:cTn id="19" presetID="1" presetClass="exit" presetSubtype="0" fill="hold" grpId="1" nodeType="clickEffect">
+                                <p:cTn id="15" presetID="10" presetClass="entr" presetSubtype="0" fill="hold" grpId="0" nodeType="clickEffect">
                                   <p:stCondLst>
                                     <p:cond delay="0"/>
                                   </p:stCondLst>
                                   <p:childTnLst>
                                     <p:set>
                                       <p:cBhvr>
-                                        <p:cTn id="20" dur="1" fill="hold">
-                                          <p:stCondLst>
-                                            <p:cond delay="0"/>
-                                          </p:stCondLst>
-                                        </p:cTn>
-                                        <p:tgtEl>
-                                          <p:spTgt spid="10"/>
-                                        </p:tgtEl>
-                                        <p:attrNameLst>
-                                          <p:attrName>style.visibility</p:attrName>
-                                        </p:attrNameLst>
-                                      </p:cBhvr>
-                                      <p:to>
-                                        <p:strVal val="hidden"/>
-                                      </p:to>
-                                    </p:set>
-                                  </p:childTnLst>
-                                </p:cTn>
-                              </p:par>
-                              <p:par>
-                                <p:cTn id="21" presetID="10" presetClass="entr" presetSubtype="0" fill="hold" grpId="0" nodeType="withEffect">
-                                  <p:stCondLst>
-                                    <p:cond delay="0"/>
-                                  </p:stCondLst>
-                                  <p:childTnLst>
-                                    <p:set>
-                                      <p:cBhvr>
-                                        <p:cTn id="22" dur="1" fill="hold">
+                                        <p:cTn id="16" dur="1" fill="hold">
                                           <p:stCondLst>
                                             <p:cond delay="0"/>
                                           </p:stCondLst>
@@ -13797,7 +13606,7 @@
                                     </p:set>
                                     <p:animEffect transition="in" filter="fade">
                                       <p:cBhvr>
-                                        <p:cTn id="23" dur="500"/>
+                                        <p:cTn id="17" dur="500"/>
                                         <p:tgtEl>
                                           <p:spTgt spid="12"/>
                                         </p:tgtEl>
@@ -13813,53 +13622,26 @@
                     </p:cTn>
                   </p:par>
                   <p:par>
-                    <p:cTn id="24" fill="hold">
+                    <p:cTn id="18" fill="hold">
                       <p:stCondLst>
                         <p:cond delay="indefinite"/>
                       </p:stCondLst>
                       <p:childTnLst>
                         <p:par>
-                          <p:cTn id="25" fill="hold">
+                          <p:cTn id="19" fill="hold">
                             <p:stCondLst>
                               <p:cond delay="0"/>
                             </p:stCondLst>
                             <p:childTnLst>
                               <p:par>
-                                <p:cTn id="26" presetID="1" presetClass="exit" presetSubtype="0" fill="hold" grpId="1" nodeType="clickEffect">
+                                <p:cTn id="20" presetID="10" presetClass="entr" presetSubtype="0" fill="hold" grpId="0" nodeType="clickEffect">
                                   <p:stCondLst>
                                     <p:cond delay="0"/>
                                   </p:stCondLst>
                                   <p:childTnLst>
                                     <p:set>
                                       <p:cBhvr>
-                                        <p:cTn id="27" dur="1" fill="hold">
-                                          <p:stCondLst>
-                                            <p:cond delay="0"/>
-                                          </p:stCondLst>
-                                        </p:cTn>
-                                        <p:tgtEl>
-                                          <p:spTgt spid="12"/>
-                                        </p:tgtEl>
-                                        <p:attrNameLst>
-                                          <p:attrName>style.visibility</p:attrName>
-                                        </p:attrNameLst>
-                                      </p:cBhvr>
-                                      <p:to>
-                                        <p:strVal val="hidden"/>
-                                      </p:to>
-                                    </p:set>
-                                  </p:childTnLst>
-                                </p:cTn>
-                              </p:par>
-                              <p:par>
-                                <p:cTn id="28" presetID="10" presetClass="entr" presetSubtype="0" fill="hold" grpId="0" nodeType="withEffect">
-                                  <p:stCondLst>
-                                    <p:cond delay="0"/>
-                                  </p:stCondLst>
-                                  <p:childTnLst>
-                                    <p:set>
-                                      <p:cBhvr>
-                                        <p:cTn id="29" dur="1" fill="hold">
+                                        <p:cTn id="21" dur="1" fill="hold">
                                           <p:stCondLst>
                                             <p:cond delay="0"/>
                                           </p:stCondLst>
@@ -13877,57 +13659,12 @@
                                     </p:set>
                                     <p:animEffect transition="in" filter="fade">
                                       <p:cBhvr>
-                                        <p:cTn id="30" dur="500"/>
+                                        <p:cTn id="22" dur="500"/>
                                         <p:tgtEl>
                                           <p:spTgt spid="35"/>
                                         </p:tgtEl>
                                       </p:cBhvr>
                                     </p:animEffect>
-                                  </p:childTnLst>
-                                </p:cTn>
-                              </p:par>
-                            </p:childTnLst>
-                          </p:cTn>
-                        </p:par>
-                      </p:childTnLst>
-                    </p:cTn>
-                  </p:par>
-                  <p:par>
-                    <p:cTn id="31" fill="hold">
-                      <p:stCondLst>
-                        <p:cond delay="indefinite"/>
-                      </p:stCondLst>
-                      <p:childTnLst>
-                        <p:par>
-                          <p:cTn id="32" fill="hold">
-                            <p:stCondLst>
-                              <p:cond delay="0"/>
-                            </p:stCondLst>
-                            <p:childTnLst>
-                              <p:par>
-                                <p:cTn id="33" presetID="1" presetClass="exit" presetSubtype="0" fill="hold" grpId="1" nodeType="clickEffect">
-                                  <p:stCondLst>
-                                    <p:cond delay="0"/>
-                                  </p:stCondLst>
-                                  <p:childTnLst>
-                                    <p:set>
-                                      <p:cBhvr>
-                                        <p:cTn id="34" dur="1" fill="hold">
-                                          <p:stCondLst>
-                                            <p:cond delay="0"/>
-                                          </p:stCondLst>
-                                        </p:cTn>
-                                        <p:tgtEl>
-                                          <p:spTgt spid="35"/>
-                                        </p:tgtEl>
-                                        <p:attrNameLst>
-                                          <p:attrName>style.visibility</p:attrName>
-                                        </p:attrNameLst>
-                                      </p:cBhvr>
-                                      <p:to>
-                                        <p:strVal val="hidden"/>
-                                      </p:to>
-                                    </p:set>
                                   </p:childTnLst>
                                 </p:cTn>
                               </p:par>
@@ -13960,14 +13697,9 @@
     </p:tnLst>
     <p:bldLst>
       <p:bldP spid="10" grpId="0"/>
-      <p:bldP spid="10" grpId="1"/>
       <p:bldP spid="12" grpId="0"/>
-      <p:bldP spid="12" grpId="1"/>
       <p:bldP spid="20" grpId="0"/>
-      <p:bldP spid="20" grpId="1"/>
       <p:bldP spid="35" grpId="0"/>
-      <p:bldP spid="35" grpId="1"/>
-      <p:bldP spid="49" grpId="0"/>
     </p:bldLst>
   </p:timing>
 </p:sld>
@@ -14366,7 +14098,7 @@
           <a:p>
             <a:r>
               <a:rPr lang="en-US" sz="2800" cap="none" dirty="0"/>
-              <a:t>COSMOS – open source user interface that connects to embedded systems</a:t>
+              <a:t>COSMOS – open source system that connects to embedded systems</a:t>
             </a:r>
           </a:p>
           <a:p>
@@ -17359,8 +17091,12 @@
           <a:lstStyle/>
           <a:p>
             <a:r>
+              <a:rPr lang="en-US" sz="2700" cap="none"/>
+              <a:t>Interfaces, </a:t>
+            </a:r>
+            <a:r>
               <a:rPr lang="en-US" sz="2700" cap="none" dirty="0"/>
-              <a:t>Servers, write protocols and read protocols link to ruby scripts allowing for custom creation</a:t>
+              <a:t>write protocols and read protocols link to ruby scripts allowing for custom creation</a:t>
             </a:r>
           </a:p>
           <a:p>
@@ -18496,7 +18232,7 @@
                             </p:stCondLst>
                             <p:childTnLst>
                               <p:par>
-                                <p:cTn id="5" presetID="1" presetClass="exit" presetSubtype="0" fill="hold" grpId="0" nodeType="clickEffect">
+                                <p:cTn id="5" presetID="10" presetClass="entr" presetSubtype="0" fill="hold" grpId="1" nodeType="clickEffect">
                                   <p:stCondLst>
                                     <p:cond delay="0"/>
                                   </p:stCondLst>
@@ -18504,60 +18240,6 @@
                                     <p:set>
                                       <p:cBhvr>
                                         <p:cTn id="6" dur="1" fill="hold">
-                                          <p:stCondLst>
-                                            <p:cond delay="0"/>
-                                          </p:stCondLst>
-                                        </p:cTn>
-                                        <p:tgtEl>
-                                          <p:spTgt spid="24"/>
-                                        </p:tgtEl>
-                                        <p:attrNameLst>
-                                          <p:attrName>style.visibility</p:attrName>
-                                        </p:attrNameLst>
-                                      </p:cBhvr>
-                                      <p:to>
-                                        <p:strVal val="hidden"/>
-                                      </p:to>
-                                    </p:set>
-                                  </p:childTnLst>
-                                </p:cTn>
-                              </p:par>
-                              <p:par>
-                                <p:cTn id="7" presetID="1" presetClass="exit" presetSubtype="0" fill="hold" nodeType="withEffect">
-                                  <p:stCondLst>
-                                    <p:cond delay="0"/>
-                                  </p:stCondLst>
-                                  <p:childTnLst>
-                                    <p:set>
-                                      <p:cBhvr>
-                                        <p:cTn id="8" dur="1" fill="hold">
-                                          <p:stCondLst>
-                                            <p:cond delay="0"/>
-                                          </p:stCondLst>
-                                        </p:cTn>
-                                        <p:tgtEl>
-                                          <p:spTgt spid="17"/>
-                                        </p:tgtEl>
-                                        <p:attrNameLst>
-                                          <p:attrName>style.visibility</p:attrName>
-                                        </p:attrNameLst>
-                                      </p:cBhvr>
-                                      <p:to>
-                                        <p:strVal val="hidden"/>
-                                      </p:to>
-                                    </p:set>
-                                  </p:childTnLst>
-                                </p:cTn>
-                              </p:par>
-                              <p:par>
-                                <p:cTn id="9" presetID="10" presetClass="entr" presetSubtype="0" fill="hold" grpId="1" nodeType="withEffect">
-                                  <p:stCondLst>
-                                    <p:cond delay="0"/>
-                                  </p:stCondLst>
-                                  <p:childTnLst>
-                                    <p:set>
-                                      <p:cBhvr>
-                                        <p:cTn id="10" dur="1" fill="hold">
                                           <p:stCondLst>
                                             <p:cond delay="0"/>
                                           </p:stCondLst>
@@ -18575,7 +18257,7 @@
                                     </p:set>
                                     <p:animEffect transition="in" filter="fade">
                                       <p:cBhvr>
-                                        <p:cTn id="11" dur="500"/>
+                                        <p:cTn id="7" dur="500"/>
                                         <p:tgtEl>
                                           <p:spTgt spid="27"/>
                                         </p:tgtEl>
@@ -18585,14 +18267,14 @@
                                 </p:cTn>
                               </p:par>
                               <p:par>
-                                <p:cTn id="12" presetID="10" presetClass="entr" presetSubtype="0" fill="hold" nodeType="withEffect">
+                                <p:cTn id="8" presetID="10" presetClass="entr" presetSubtype="0" fill="hold" nodeType="withEffect">
                                   <p:stCondLst>
                                     <p:cond delay="0"/>
                                   </p:stCondLst>
                                   <p:childTnLst>
                                     <p:set>
                                       <p:cBhvr>
-                                        <p:cTn id="13" dur="1" fill="hold">
+                                        <p:cTn id="9" dur="1" fill="hold">
                                           <p:stCondLst>
                                             <p:cond delay="0"/>
                                           </p:stCondLst>
@@ -18610,7 +18292,7 @@
                                     </p:set>
                                     <p:animEffect transition="in" filter="fade">
                                       <p:cBhvr>
-                                        <p:cTn id="14" dur="500"/>
+                                        <p:cTn id="10" dur="500"/>
                                         <p:tgtEl>
                                           <p:spTgt spid="26"/>
                                         </p:tgtEl>
@@ -18626,80 +18308,26 @@
                     </p:cTn>
                   </p:par>
                   <p:par>
-                    <p:cTn id="15" fill="hold">
+                    <p:cTn id="11" fill="hold">
                       <p:stCondLst>
                         <p:cond delay="indefinite"/>
                       </p:stCondLst>
                       <p:childTnLst>
                         <p:par>
-                          <p:cTn id="16" fill="hold">
+                          <p:cTn id="12" fill="hold">
                             <p:stCondLst>
                               <p:cond delay="0"/>
                             </p:stCondLst>
                             <p:childTnLst>
                               <p:par>
-                                <p:cTn id="17" presetID="1" presetClass="exit" presetSubtype="0" fill="hold" grpId="0" nodeType="clickEffect">
+                                <p:cTn id="13" presetID="10" presetClass="entr" presetSubtype="0" fill="hold" grpId="1" nodeType="clickEffect">
                                   <p:stCondLst>
                                     <p:cond delay="0"/>
                                   </p:stCondLst>
                                   <p:childTnLst>
                                     <p:set>
                                       <p:cBhvr>
-                                        <p:cTn id="18" dur="1" fill="hold">
-                                          <p:stCondLst>
-                                            <p:cond delay="0"/>
-                                          </p:stCondLst>
-                                        </p:cTn>
-                                        <p:tgtEl>
-                                          <p:spTgt spid="27"/>
-                                        </p:tgtEl>
-                                        <p:attrNameLst>
-                                          <p:attrName>style.visibility</p:attrName>
-                                        </p:attrNameLst>
-                                      </p:cBhvr>
-                                      <p:to>
-                                        <p:strVal val="hidden"/>
-                                      </p:to>
-                                    </p:set>
-                                  </p:childTnLst>
-                                </p:cTn>
-                              </p:par>
-                              <p:par>
-                                <p:cTn id="19" presetID="1" presetClass="exit" presetSubtype="0" fill="hold" nodeType="withEffect">
-                                  <p:stCondLst>
-                                    <p:cond delay="0"/>
-                                  </p:stCondLst>
-                                  <p:childTnLst>
-                                    <p:set>
-                                      <p:cBhvr>
-                                        <p:cTn id="20" dur="1" fill="hold">
-                                          <p:stCondLst>
-                                            <p:cond delay="0"/>
-                                          </p:stCondLst>
-                                        </p:cTn>
-                                        <p:tgtEl>
-                                          <p:spTgt spid="26"/>
-                                        </p:tgtEl>
-                                        <p:attrNameLst>
-                                          <p:attrName>style.visibility</p:attrName>
-                                        </p:attrNameLst>
-                                      </p:cBhvr>
-                                      <p:to>
-                                        <p:strVal val="hidden"/>
-                                      </p:to>
-                                    </p:set>
-                                  </p:childTnLst>
-                                </p:cTn>
-                              </p:par>
-                              <p:par>
-                                <p:cTn id="21" presetID="10" presetClass="entr" presetSubtype="0" fill="hold" grpId="1" nodeType="withEffect">
-                                  <p:stCondLst>
-                                    <p:cond delay="0"/>
-                                  </p:stCondLst>
-                                  <p:childTnLst>
-                                    <p:set>
-                                      <p:cBhvr>
-                                        <p:cTn id="22" dur="1" fill="hold">
+                                        <p:cTn id="14" dur="1" fill="hold">
                                           <p:stCondLst>
                                             <p:cond delay="0"/>
                                           </p:stCondLst>
@@ -18717,9 +18345,97 @@
                                     </p:set>
                                     <p:animEffect transition="in" filter="fade">
                                       <p:cBhvr>
+                                        <p:cTn id="15" dur="500"/>
+                                        <p:tgtEl>
+                                          <p:spTgt spid="32"/>
+                                        </p:tgtEl>
+                                      </p:cBhvr>
+                                    </p:animEffect>
+                                  </p:childTnLst>
+                                </p:cTn>
+                              </p:par>
+                              <p:par>
+                                <p:cTn id="16" presetID="10" presetClass="entr" presetSubtype="0" fill="hold" nodeType="withEffect">
+                                  <p:stCondLst>
+                                    <p:cond delay="0"/>
+                                  </p:stCondLst>
+                                  <p:childTnLst>
+                                    <p:set>
+                                      <p:cBhvr>
+                                        <p:cTn id="17" dur="1" fill="hold">
+                                          <p:stCondLst>
+                                            <p:cond delay="0"/>
+                                          </p:stCondLst>
+                                        </p:cTn>
+                                        <p:tgtEl>
+                                          <p:spTgt spid="31"/>
+                                        </p:tgtEl>
+                                        <p:attrNameLst>
+                                          <p:attrName>style.visibility</p:attrName>
+                                        </p:attrNameLst>
+                                      </p:cBhvr>
+                                      <p:to>
+                                        <p:strVal val="visible"/>
+                                      </p:to>
+                                    </p:set>
+                                    <p:animEffect transition="in" filter="fade">
+                                      <p:cBhvr>
+                                        <p:cTn id="18" dur="500"/>
+                                        <p:tgtEl>
+                                          <p:spTgt spid="31"/>
+                                        </p:tgtEl>
+                                      </p:cBhvr>
+                                    </p:animEffect>
+                                  </p:childTnLst>
+                                </p:cTn>
+                              </p:par>
+                            </p:childTnLst>
+                          </p:cTn>
+                        </p:par>
+                      </p:childTnLst>
+                    </p:cTn>
+                  </p:par>
+                  <p:par>
+                    <p:cTn id="19" fill="hold">
+                      <p:stCondLst>
+                        <p:cond delay="indefinite"/>
+                      </p:stCondLst>
+                      <p:childTnLst>
+                        <p:par>
+                          <p:cTn id="20" fill="hold">
+                            <p:stCondLst>
+                              <p:cond delay="0"/>
+                            </p:stCondLst>
+                            <p:childTnLst>
+                              <p:par>
+                                <p:cTn id="21" presetID="10" presetClass="entr" presetSubtype="0" fill="hold" grpId="0" nodeType="clickEffect">
+                                  <p:stCondLst>
+                                    <p:cond delay="0"/>
+                                  </p:stCondLst>
+                                  <p:childTnLst>
+                                    <p:set>
+                                      <p:cBhvr>
+                                        <p:cTn id="22" dur="1" fill="hold">
+                                          <p:stCondLst>
+                                            <p:cond delay="0"/>
+                                          </p:stCondLst>
+                                        </p:cTn>
+                                        <p:tgtEl>
+                                          <p:spTgt spid="37"/>
+                                        </p:tgtEl>
+                                        <p:attrNameLst>
+                                          <p:attrName>style.visibility</p:attrName>
+                                        </p:attrNameLst>
+                                      </p:cBhvr>
+                                      <p:to>
+                                        <p:strVal val="visible"/>
+                                      </p:to>
+                                    </p:set>
+                                    <p:animEffect transition="in" filter="fade">
+                                      <p:cBhvr>
                                         <p:cTn id="23" dur="500"/>
                                         <p:tgtEl>
-                                          <p:spTgt spid="32"/>
+                                          <p:spTgt spid="37"/>
                                         </p:tgtEl>
                                       </p:cBhvr>
                                     </p:animEffect>
@@ -18740,7 +18456,7 @@
                                           </p:stCondLst>
                                         </p:cTn>
                                         <p:tgtEl>
-                                          <p:spTgt spid="31"/>
+                                          <p:spTgt spid="36"/>
                                         </p:tgtEl>
                                         <p:attrNameLst>
                                           <p:attrName>style.visibility</p:attrName>
@@ -18753,148 +18469,6 @@
                                     <p:animEffect transition="in" filter="fade">
                                       <p:cBhvr>
                                         <p:cTn id="26" dur="500"/>
-                                        <p:tgtEl>
-                                          <p:spTgt spid="31"/>
-                                        </p:tgtEl>
-                                      </p:cBhvr>
-                                    </p:animEffect>
-                                  </p:childTnLst>
-                                </p:cTn>
-                              </p:par>
-                            </p:childTnLst>
-                          </p:cTn>
-                        </p:par>
-                      </p:childTnLst>
-                    </p:cTn>
-                  </p:par>
-                  <p:par>
-                    <p:cTn id="27" fill="hold">
-                      <p:stCondLst>
-                        <p:cond delay="indefinite"/>
-                      </p:stCondLst>
-                      <p:childTnLst>
-                        <p:par>
-                          <p:cTn id="28" fill="hold">
-                            <p:stCondLst>
-                              <p:cond delay="0"/>
-                            </p:stCondLst>
-                            <p:childTnLst>
-                              <p:par>
-                                <p:cTn id="29" presetID="1" presetClass="exit" presetSubtype="0" fill="hold" grpId="0" nodeType="clickEffect">
-                                  <p:stCondLst>
-                                    <p:cond delay="0"/>
-                                  </p:stCondLst>
-                                  <p:childTnLst>
-                                    <p:set>
-                                      <p:cBhvr>
-                                        <p:cTn id="30" dur="1" fill="hold">
-                                          <p:stCondLst>
-                                            <p:cond delay="0"/>
-                                          </p:stCondLst>
-                                        </p:cTn>
-                                        <p:tgtEl>
-                                          <p:spTgt spid="32"/>
-                                        </p:tgtEl>
-                                        <p:attrNameLst>
-                                          <p:attrName>style.visibility</p:attrName>
-                                        </p:attrNameLst>
-                                      </p:cBhvr>
-                                      <p:to>
-                                        <p:strVal val="hidden"/>
-                                      </p:to>
-                                    </p:set>
-                                  </p:childTnLst>
-                                </p:cTn>
-                              </p:par>
-                              <p:par>
-                                <p:cTn id="31" presetID="1" presetClass="exit" presetSubtype="0" fill="hold" nodeType="withEffect">
-                                  <p:stCondLst>
-                                    <p:cond delay="0"/>
-                                  </p:stCondLst>
-                                  <p:childTnLst>
-                                    <p:set>
-                                      <p:cBhvr>
-                                        <p:cTn id="32" dur="1" fill="hold">
-                                          <p:stCondLst>
-                                            <p:cond delay="0"/>
-                                          </p:stCondLst>
-                                        </p:cTn>
-                                        <p:tgtEl>
-                                          <p:spTgt spid="31"/>
-                                        </p:tgtEl>
-                                        <p:attrNameLst>
-                                          <p:attrName>style.visibility</p:attrName>
-                                        </p:attrNameLst>
-                                      </p:cBhvr>
-                                      <p:to>
-                                        <p:strVal val="hidden"/>
-                                      </p:to>
-                                    </p:set>
-                                  </p:childTnLst>
-                                </p:cTn>
-                              </p:par>
-                              <p:par>
-                                <p:cTn id="33" presetID="10" presetClass="entr" presetSubtype="0" fill="hold" grpId="0" nodeType="withEffect">
-                                  <p:stCondLst>
-                                    <p:cond delay="0"/>
-                                  </p:stCondLst>
-                                  <p:childTnLst>
-                                    <p:set>
-                                      <p:cBhvr>
-                                        <p:cTn id="34" dur="1" fill="hold">
-                                          <p:stCondLst>
-                                            <p:cond delay="0"/>
-                                          </p:stCondLst>
-                                        </p:cTn>
-                                        <p:tgtEl>
-                                          <p:spTgt spid="37"/>
-                                        </p:tgtEl>
-                                        <p:attrNameLst>
-                                          <p:attrName>style.visibility</p:attrName>
-                                        </p:attrNameLst>
-                                      </p:cBhvr>
-                                      <p:to>
-                                        <p:strVal val="visible"/>
-                                      </p:to>
-                                    </p:set>
-                                    <p:animEffect transition="in" filter="fade">
-                                      <p:cBhvr>
-                                        <p:cTn id="35" dur="500"/>
-                                        <p:tgtEl>
-                                          <p:spTgt spid="37"/>
-                                        </p:tgtEl>
-                                      </p:cBhvr>
-                                    </p:animEffect>
-                                  </p:childTnLst>
-                                </p:cTn>
-                              </p:par>
-                              <p:par>
-                                <p:cTn id="36" presetID="10" presetClass="entr" presetSubtype="0" fill="hold" nodeType="withEffect">
-                                  <p:stCondLst>
-                                    <p:cond delay="0"/>
-                                  </p:stCondLst>
-                                  <p:childTnLst>
-                                    <p:set>
-                                      <p:cBhvr>
-                                        <p:cTn id="37" dur="1" fill="hold">
-                                          <p:stCondLst>
-                                            <p:cond delay="0"/>
-                                          </p:stCondLst>
-                                        </p:cTn>
-                                        <p:tgtEl>
-                                          <p:spTgt spid="36"/>
-                                        </p:tgtEl>
-                                        <p:attrNameLst>
-                                          <p:attrName>style.visibility</p:attrName>
-                                        </p:attrNameLst>
-                                      </p:cBhvr>
-                                      <p:to>
-                                        <p:strVal val="visible"/>
-                                      </p:to>
-                                    </p:set>
-                                    <p:animEffect transition="in" filter="fade">
-                                      <p:cBhvr>
-                                        <p:cTn id="38" dur="500"/>
                                         <p:tgtEl>
                                           <p:spTgt spid="36"/>
                                         </p:tgtEl>
@@ -18931,10 +18505,7 @@
       </p:par>
     </p:tnLst>
     <p:bldLst>
-      <p:bldP spid="24" grpId="0" animBg="1"/>
-      <p:bldP spid="27" grpId="0" animBg="1"/>
       <p:bldP spid="27" grpId="1" animBg="1"/>
-      <p:bldP spid="32" grpId="0" animBg="1"/>
       <p:bldP spid="32" grpId="1" animBg="1"/>
       <p:bldP spid="37" grpId="0" animBg="1"/>
     </p:bldLst>

</xml_diff>